<commit_message>
- XGI PLC : 내부 변수 생성시 부터 windows 와 XGI platform 고려해서 생성.
</commit_message>
<xml_diff>
--- a/DsDotNet/src/PLC/PLC.CodeGen.LSXGI/Documents/Classes.pptx
+++ b/DsDotNet/src/PLC/PLC.CodeGen.LSXGI/Documents/Classes.pptx
@@ -105,6 +105,11 @@
       </a:defRPr>
     </a:lvl9pPr>
   </p:defaultTextStyle>
+  <p:extLst>
+    <p:ext uri="{EFAFB233-063F-42B5-8137-9DF3F51BA10A}">
+      <p15:sldGuideLst xmlns:p15="http://schemas.microsoft.com/office/powerpoint/2012/main"/>
+    </p:ext>
+  </p:extLst>
 </p:presentation>
 </file>
 
@@ -3902,7 +3907,7 @@
         </p:nvSpPr>
         <p:spPr>
           <a:xfrm>
-            <a:off x="4274112" y="4489422"/>
+            <a:off x="2578049" y="3936642"/>
             <a:ext cx="1390124" cy="246221"/>
           </a:xfrm>
           <a:prstGeom prst="rect">
@@ -3964,8 +3969,8 @@
         </p:nvCxnSpPr>
         <p:spPr>
           <a:xfrm>
-            <a:off x="4969174" y="4735643"/>
-            <a:ext cx="1798270" cy="519624"/>
+            <a:off x="3273111" y="4182863"/>
+            <a:ext cx="3494333" cy="1072404"/>
           </a:xfrm>
           <a:prstGeom prst="straightConnector1">
             <a:avLst/>
@@ -5749,8 +5754,8 @@
         </p:nvCxnSpPr>
         <p:spPr>
           <a:xfrm rot="16200000" flipH="1">
-            <a:off x="2590120" y="2110367"/>
-            <a:ext cx="933409" cy="3824700"/>
+            <a:off x="2018478" y="2682008"/>
+            <a:ext cx="380629" cy="2128637"/>
           </a:xfrm>
           <a:prstGeom prst="curvedConnector3">
             <a:avLst>
@@ -5986,7 +5991,50 @@
         <p:spPr>
           <a:xfrm>
             <a:off x="3051663" y="2534963"/>
-            <a:ext cx="1917511" cy="1954459"/>
+            <a:ext cx="221448" cy="1401679"/>
+          </a:xfrm>
+          <a:prstGeom prst="straightConnector1">
+            <a:avLst/>
+          </a:prstGeom>
+          <a:ln>
+            <a:tailEnd type="triangle"/>
+          </a:ln>
+        </p:spPr>
+        <p:style>
+          <a:lnRef idx="1">
+            <a:schemeClr val="accent1"/>
+          </a:lnRef>
+          <a:fillRef idx="0">
+            <a:schemeClr val="accent1"/>
+          </a:fillRef>
+          <a:effectRef idx="0">
+            <a:schemeClr val="accent1"/>
+          </a:effectRef>
+          <a:fontRef idx="minor">
+            <a:schemeClr val="tx1"/>
+          </a:fontRef>
+        </p:style>
+      </p:cxnSp>
+      <p:cxnSp>
+        <p:nvCxnSpPr>
+          <p:cNvPr id="5" name="직선 화살표 연결선 4">
+            <a:extLst>
+              <a:ext uri="{FF2B5EF4-FFF2-40B4-BE49-F238E27FC236}">
+                <a16:creationId xmlns:a16="http://schemas.microsoft.com/office/drawing/2014/main" id="{F68D8CD6-4A17-924D-2788-02FD9D4DA053}"/>
+              </a:ext>
+            </a:extLst>
+          </p:cNvPr>
+          <p:cNvCxnSpPr>
+            <a:cxnSpLocks/>
+            <a:stCxn id="28" idx="2"/>
+            <a:endCxn id="71" idx="0"/>
+          </p:cNvCxnSpPr>
+          <p:nvPr/>
+        </p:nvCxnSpPr>
+        <p:spPr>
+          <a:xfrm flipH="1">
+            <a:off x="1144473" y="4182863"/>
+            <a:ext cx="2128638" cy="1106792"/>
           </a:xfrm>
           <a:prstGeom prst="straightConnector1">
             <a:avLst/>

</xml_diff>

<commit_message>
- Class Hierachies pptx documents added.
</commit_message>
<xml_diff>
--- a/DsDotNet/src/PLC/PLC.CodeGen.LSXGI/Documents/Classes.pptx
+++ b/DsDotNet/src/PLC/PLC.CodeGen.LSXGI/Documents/Classes.pptx
@@ -260,7 +260,7 @@
           <a:p>
             <a:fld id="{77A14DAC-8C3A-4BE7-9B5C-765676DEE782}" type="datetimeFigureOut">
               <a:rPr lang="ko-KR" altLang="en-US" smtClean="0"/>
-              <a:t>2023-01-08</a:t>
+              <a:t>2023-01-17</a:t>
             </a:fld>
             <a:endParaRPr lang="ko-KR" altLang="en-US" dirty="0"/>
           </a:p>
@@ -458,7 +458,7 @@
           <a:p>
             <a:fld id="{77A14DAC-8C3A-4BE7-9B5C-765676DEE782}" type="datetimeFigureOut">
               <a:rPr lang="ko-KR" altLang="en-US" smtClean="0"/>
-              <a:t>2023-01-08</a:t>
+              <a:t>2023-01-17</a:t>
             </a:fld>
             <a:endParaRPr lang="ko-KR" altLang="en-US" dirty="0"/>
           </a:p>
@@ -666,7 +666,7 @@
           <a:p>
             <a:fld id="{77A14DAC-8C3A-4BE7-9B5C-765676DEE782}" type="datetimeFigureOut">
               <a:rPr lang="ko-KR" altLang="en-US" smtClean="0"/>
-              <a:t>2023-01-08</a:t>
+              <a:t>2023-01-17</a:t>
             </a:fld>
             <a:endParaRPr lang="ko-KR" altLang="en-US" dirty="0"/>
           </a:p>
@@ -864,7 +864,7 @@
           <a:p>
             <a:fld id="{77A14DAC-8C3A-4BE7-9B5C-765676DEE782}" type="datetimeFigureOut">
               <a:rPr lang="ko-KR" altLang="en-US" smtClean="0"/>
-              <a:t>2023-01-08</a:t>
+              <a:t>2023-01-17</a:t>
             </a:fld>
             <a:endParaRPr lang="ko-KR" altLang="en-US" dirty="0"/>
           </a:p>
@@ -1139,7 +1139,7 @@
           <a:p>
             <a:fld id="{77A14DAC-8C3A-4BE7-9B5C-765676DEE782}" type="datetimeFigureOut">
               <a:rPr lang="ko-KR" altLang="en-US" smtClean="0"/>
-              <a:t>2023-01-08</a:t>
+              <a:t>2023-01-17</a:t>
             </a:fld>
             <a:endParaRPr lang="ko-KR" altLang="en-US" dirty="0"/>
           </a:p>
@@ -1404,7 +1404,7 @@
           <a:p>
             <a:fld id="{77A14DAC-8C3A-4BE7-9B5C-765676DEE782}" type="datetimeFigureOut">
               <a:rPr lang="ko-KR" altLang="en-US" smtClean="0"/>
-              <a:t>2023-01-08</a:t>
+              <a:t>2023-01-17</a:t>
             </a:fld>
             <a:endParaRPr lang="ko-KR" altLang="en-US" dirty="0"/>
           </a:p>
@@ -1816,7 +1816,7 @@
           <a:p>
             <a:fld id="{77A14DAC-8C3A-4BE7-9B5C-765676DEE782}" type="datetimeFigureOut">
               <a:rPr lang="ko-KR" altLang="en-US" smtClean="0"/>
-              <a:t>2023-01-08</a:t>
+              <a:t>2023-01-17</a:t>
             </a:fld>
             <a:endParaRPr lang="ko-KR" altLang="en-US" dirty="0"/>
           </a:p>
@@ -1957,7 +1957,7 @@
           <a:p>
             <a:fld id="{77A14DAC-8C3A-4BE7-9B5C-765676DEE782}" type="datetimeFigureOut">
               <a:rPr lang="ko-KR" altLang="en-US" smtClean="0"/>
-              <a:t>2023-01-08</a:t>
+              <a:t>2023-01-17</a:t>
             </a:fld>
             <a:endParaRPr lang="ko-KR" altLang="en-US" dirty="0"/>
           </a:p>
@@ -2070,7 +2070,7 @@
           <a:p>
             <a:fld id="{77A14DAC-8C3A-4BE7-9B5C-765676DEE782}" type="datetimeFigureOut">
               <a:rPr lang="ko-KR" altLang="en-US" smtClean="0"/>
-              <a:t>2023-01-08</a:t>
+              <a:t>2023-01-17</a:t>
             </a:fld>
             <a:endParaRPr lang="ko-KR" altLang="en-US" dirty="0"/>
           </a:p>
@@ -2381,7 +2381,7 @@
           <a:p>
             <a:fld id="{77A14DAC-8C3A-4BE7-9B5C-765676DEE782}" type="datetimeFigureOut">
               <a:rPr lang="ko-KR" altLang="en-US" smtClean="0"/>
-              <a:t>2023-01-08</a:t>
+              <a:t>2023-01-17</a:t>
             </a:fld>
             <a:endParaRPr lang="ko-KR" altLang="en-US" dirty="0"/>
           </a:p>
@@ -2669,7 +2669,7 @@
           <a:p>
             <a:fld id="{77A14DAC-8C3A-4BE7-9B5C-765676DEE782}" type="datetimeFigureOut">
               <a:rPr lang="ko-KR" altLang="en-US" smtClean="0"/>
-              <a:t>2023-01-08</a:t>
+              <a:t>2023-01-17</a:t>
             </a:fld>
             <a:endParaRPr lang="ko-KR" altLang="en-US" dirty="0"/>
           </a:p>
@@ -2910,7 +2910,7 @@
           <a:p>
             <a:fld id="{77A14DAC-8C3A-4BE7-9B5C-765676DEE782}" type="datetimeFigureOut">
               <a:rPr lang="ko-KR" altLang="en-US" smtClean="0"/>
-              <a:t>2023-01-08</a:t>
+              <a:t>2023-01-17</a:t>
             </a:fld>
             <a:endParaRPr lang="ko-KR" altLang="en-US" dirty="0"/>
           </a:p>
@@ -3407,12 +3407,42 @@
           <a:chExt cx="0" cy="0"/>
         </a:xfrm>
       </p:grpSpPr>
-      <p:sp>
-        <p:nvSpPr>
-          <p:cNvPr id="6" name="TextBox 5">
-            <a:extLst>
-              <a:ext uri="{FF2B5EF4-FFF2-40B4-BE49-F238E27FC236}">
-                <a16:creationId xmlns:a16="http://schemas.microsoft.com/office/drawing/2014/main" id="{1BC3D781-011D-04CF-73B7-12BE30151994}"/>
+      <p:pic>
+        <p:nvPicPr>
+          <p:cNvPr id="3" name="그림 2">
+            <a:extLst>
+              <a:ext uri="{FF2B5EF4-FFF2-40B4-BE49-F238E27FC236}">
+                <a16:creationId xmlns:a16="http://schemas.microsoft.com/office/drawing/2014/main" id="{F87149A3-ACF1-DD05-B76B-9EA687B68E76}"/>
+              </a:ext>
+            </a:extLst>
+          </p:cNvPr>
+          <p:cNvPicPr>
+            <a:picLocks noChangeAspect="1"/>
+          </p:cNvPicPr>
+          <p:nvPr/>
+        </p:nvPicPr>
+        <p:blipFill>
+          <a:blip r:embed="rId2"/>
+          <a:stretch>
+            <a:fillRect/>
+          </a:stretch>
+        </p:blipFill>
+        <p:spPr>
+          <a:xfrm>
+            <a:off x="967667" y="713551"/>
+            <a:ext cx="9334300" cy="6144449"/>
+          </a:xfrm>
+          <a:prstGeom prst="rect">
+            <a:avLst/>
+          </a:prstGeom>
+        </p:spPr>
+      </p:pic>
+      <p:sp>
+        <p:nvSpPr>
+          <p:cNvPr id="4" name="TextBox 3">
+            <a:extLst>
+              <a:ext uri="{FF2B5EF4-FFF2-40B4-BE49-F238E27FC236}">
+                <a16:creationId xmlns:a16="http://schemas.microsoft.com/office/drawing/2014/main" id="{680B1B6B-996A-048A-1BF6-1404BD80597D}"/>
               </a:ext>
             </a:extLst>
           </p:cNvPr>
@@ -3421,18 +3451,13 @@
         </p:nvSpPr>
         <p:spPr>
           <a:xfrm>
-            <a:off x="4743473" y="2432332"/>
-            <a:ext cx="1088760" cy="246221"/>
+            <a:off x="0" y="0"/>
+            <a:ext cx="7844007" cy="369332"/>
           </a:xfrm>
           <a:prstGeom prst="rect">
             <a:avLst/>
           </a:prstGeom>
           <a:noFill/>
-          <a:ln>
-            <a:solidFill>
-              <a:schemeClr val="tx1"/>
-            </a:solidFill>
-          </a:ln>
         </p:spPr>
         <p:txBody>
           <a:bodyPr wrap="none" rtlCol="0">
@@ -3441,2755 +3466,45 @@
           <a:lstStyle/>
           <a:p>
             <a:r>
-              <a:rPr lang="en-US" altLang="ko-KR" sz="1000" dirty="0">
-                <a:solidFill>
-                  <a:srgbClr val="000000"/>
-                </a:solidFill>
-                <a:latin typeface="Cascadia Mono" panose="020B0609020000020004" pitchFamily="49" charset="0"/>
-              </a:rPr>
-              <a:t>IXgiLocalVar</a:t>
-            </a:r>
-            <a:endParaRPr lang="ko-KR" altLang="en-US" sz="1000" dirty="0"/>
-          </a:p>
-        </p:txBody>
-      </p:sp>
-      <p:sp>
-        <p:nvSpPr>
-          <p:cNvPr id="8" name="TextBox 7">
-            <a:extLst>
-              <a:ext uri="{FF2B5EF4-FFF2-40B4-BE49-F238E27FC236}">
-                <a16:creationId xmlns:a16="http://schemas.microsoft.com/office/drawing/2014/main" id="{26222A57-43BE-23AC-4B6F-40E31434CC37}"/>
-              </a:ext>
-            </a:extLst>
-          </p:cNvPr>
-          <p:cNvSpPr txBox="1"/>
-          <p:nvPr/>
-        </p:nvSpPr>
-        <p:spPr>
-          <a:xfrm>
-            <a:off x="3459656" y="1431882"/>
-            <a:ext cx="862737" cy="246221"/>
-          </a:xfrm>
-          <a:prstGeom prst="rect">
-            <a:avLst/>
-          </a:prstGeom>
-          <a:noFill/>
-          <a:ln>
-            <a:solidFill>
-              <a:schemeClr val="tx1"/>
-            </a:solidFill>
-          </a:ln>
-        </p:spPr>
-        <p:txBody>
-          <a:bodyPr wrap="none" rtlCol="0">
-            <a:spAutoFit/>
-          </a:bodyPr>
-          <a:lstStyle/>
-          <a:p>
-            <a:r>
-              <a:rPr lang="en-US" altLang="ko-KR" sz="1000" dirty="0">
-                <a:solidFill>
-                  <a:srgbClr val="000000"/>
-                </a:solidFill>
-                <a:latin typeface="Cascadia Mono" panose="020B0609020000020004" pitchFamily="49" charset="0"/>
-              </a:rPr>
-              <a:t>IVariable</a:t>
-            </a:r>
-            <a:endParaRPr lang="ko-KR" altLang="en-US" sz="1000" dirty="0"/>
-          </a:p>
-        </p:txBody>
-      </p:sp>
-      <p:sp>
-        <p:nvSpPr>
-          <p:cNvPr id="9" name="TextBox 8">
-            <a:extLst>
-              <a:ext uri="{FF2B5EF4-FFF2-40B4-BE49-F238E27FC236}">
-                <a16:creationId xmlns:a16="http://schemas.microsoft.com/office/drawing/2014/main" id="{D2A67866-7FD6-2EDB-6262-AD73A9A1F8EA}"/>
-              </a:ext>
-            </a:extLst>
-          </p:cNvPr>
-          <p:cNvSpPr txBox="1"/>
-          <p:nvPr/>
-        </p:nvSpPr>
-        <p:spPr>
-          <a:xfrm>
-            <a:off x="5544995" y="1233401"/>
-            <a:ext cx="2444900" cy="246221"/>
-          </a:xfrm>
-          <a:prstGeom prst="rect">
-            <a:avLst/>
-          </a:prstGeom>
-          <a:noFill/>
-          <a:ln>
-            <a:solidFill>
-              <a:schemeClr val="tx1"/>
-            </a:solidFill>
-          </a:ln>
-        </p:spPr>
-        <p:txBody>
-          <a:bodyPr wrap="none" rtlCol="0">
-            <a:spAutoFit/>
-          </a:bodyPr>
-          <a:lstStyle/>
-          <a:p>
-            <a:r>
-              <a:rPr lang="en-US" altLang="ko-KR" sz="1000" dirty="0">
-                <a:solidFill>
-                  <a:srgbClr val="000000"/>
-                </a:solidFill>
-                <a:latin typeface="Cascadia Mono" panose="020B0609020000020004" pitchFamily="49" charset="0"/>
-              </a:rPr>
-              <a:t>INamedExpressionizableTerminal</a:t>
-            </a:r>
-            <a:endParaRPr lang="ko-KR" altLang="en-US" sz="1000" dirty="0"/>
-          </a:p>
-        </p:txBody>
-      </p:sp>
-      <p:sp>
-        <p:nvSpPr>
-          <p:cNvPr id="10" name="TextBox 9">
-            <a:extLst>
-              <a:ext uri="{FF2B5EF4-FFF2-40B4-BE49-F238E27FC236}">
-                <a16:creationId xmlns:a16="http://schemas.microsoft.com/office/drawing/2014/main" id="{DDFCE3EB-2F84-4CF0-F3F2-AF7DF59105C7}"/>
-              </a:ext>
-            </a:extLst>
-          </p:cNvPr>
-          <p:cNvSpPr txBox="1"/>
-          <p:nvPr/>
-        </p:nvSpPr>
-        <p:spPr>
-          <a:xfrm>
-            <a:off x="3801704" y="3008514"/>
-            <a:ext cx="1390124" cy="246221"/>
-          </a:xfrm>
-          <a:prstGeom prst="rect">
-            <a:avLst/>
-          </a:prstGeom>
-          <a:noFill/>
-          <a:ln>
-            <a:solidFill>
-              <a:schemeClr val="tx1"/>
-            </a:solidFill>
-          </a:ln>
-        </p:spPr>
-        <p:txBody>
-          <a:bodyPr wrap="none" rtlCol="0">
-            <a:spAutoFit/>
-          </a:bodyPr>
-          <a:lstStyle/>
-          <a:p>
-            <a:r>
-              <a:rPr lang="en-US" altLang="ko-KR" sz="1000" dirty="0">
-                <a:solidFill>
-                  <a:srgbClr val="000000"/>
-                </a:solidFill>
-                <a:latin typeface="Cascadia Mono" panose="020B0609020000020004" pitchFamily="49" charset="0"/>
-              </a:rPr>
-              <a:t>IXgiLocalVar</a:t>
-            </a:r>
-            <a:r>
-              <a:rPr lang="en-US" altLang="ko-KR" sz="1000" dirty="0">
-                <a:solidFill>
-                  <a:srgbClr val="00B0F0"/>
-                </a:solidFill>
-                <a:latin typeface="Cascadia Mono" panose="020B0609020000020004" pitchFamily="49" charset="0"/>
-              </a:rPr>
-              <a:t>&lt;'T&gt;</a:t>
-            </a:r>
-            <a:endParaRPr lang="ko-KR" altLang="en-US" sz="1000" dirty="0">
-              <a:solidFill>
-                <a:srgbClr val="00B0F0"/>
-              </a:solidFill>
-            </a:endParaRPr>
-          </a:p>
-        </p:txBody>
-      </p:sp>
-      <p:sp>
-        <p:nvSpPr>
-          <p:cNvPr id="11" name="TextBox 10">
-            <a:extLst>
-              <a:ext uri="{FF2B5EF4-FFF2-40B4-BE49-F238E27FC236}">
-                <a16:creationId xmlns:a16="http://schemas.microsoft.com/office/drawing/2014/main" id="{89465C5B-A684-AAC8-DE71-236687A715E0}"/>
-              </a:ext>
-            </a:extLst>
-          </p:cNvPr>
-          <p:cNvSpPr txBox="1"/>
-          <p:nvPr/>
-        </p:nvSpPr>
-        <p:spPr>
-          <a:xfrm>
-            <a:off x="2469612" y="2288742"/>
-            <a:ext cx="1164101" cy="246221"/>
-          </a:xfrm>
-          <a:prstGeom prst="rect">
-            <a:avLst/>
-          </a:prstGeom>
-          <a:noFill/>
-          <a:ln>
-            <a:solidFill>
-              <a:schemeClr val="tx1"/>
-            </a:solidFill>
-          </a:ln>
-        </p:spPr>
-        <p:txBody>
-          <a:bodyPr wrap="none" rtlCol="0">
-            <a:spAutoFit/>
-          </a:bodyPr>
-          <a:lstStyle/>
-          <a:p>
-            <a:r>
-              <a:rPr lang="en-US" altLang="ko-KR" sz="1000" dirty="0">
-                <a:solidFill>
-                  <a:srgbClr val="000000"/>
-                </a:solidFill>
-                <a:latin typeface="Cascadia Mono" panose="020B0609020000020004" pitchFamily="49" charset="0"/>
-              </a:rPr>
-              <a:t>IVariable</a:t>
-            </a:r>
-            <a:r>
-              <a:rPr lang="en-US" altLang="ko-KR" sz="1000" dirty="0">
-                <a:solidFill>
-                  <a:srgbClr val="00B0F0"/>
-                </a:solidFill>
-                <a:latin typeface="Cascadia Mono" panose="020B0609020000020004" pitchFamily="49" charset="0"/>
-              </a:rPr>
-              <a:t>&lt;'T&gt;</a:t>
-            </a:r>
-            <a:endParaRPr lang="ko-KR" altLang="en-US" sz="1000" dirty="0">
-              <a:solidFill>
-                <a:srgbClr val="00B0F0"/>
-              </a:solidFill>
-            </a:endParaRPr>
-          </a:p>
-        </p:txBody>
-      </p:sp>
-      <p:cxnSp>
-        <p:nvCxnSpPr>
-          <p:cNvPr id="13" name="직선 화살표 연결선 12">
-            <a:extLst>
-              <a:ext uri="{FF2B5EF4-FFF2-40B4-BE49-F238E27FC236}">
-                <a16:creationId xmlns:a16="http://schemas.microsoft.com/office/drawing/2014/main" id="{EA2891B7-9265-BD0B-C41A-10E449F80074}"/>
-              </a:ext>
-            </a:extLst>
-          </p:cNvPr>
-          <p:cNvCxnSpPr>
-            <a:stCxn id="6" idx="2"/>
-            <a:endCxn id="10" idx="0"/>
-          </p:cNvCxnSpPr>
-          <p:nvPr/>
-        </p:nvCxnSpPr>
-        <p:spPr>
-          <a:xfrm flipH="1">
-            <a:off x="4496766" y="2678553"/>
-            <a:ext cx="791087" cy="329961"/>
-          </a:xfrm>
-          <a:prstGeom prst="straightConnector1">
-            <a:avLst/>
-          </a:prstGeom>
-          <a:ln>
-            <a:tailEnd type="triangle"/>
-          </a:ln>
-        </p:spPr>
-        <p:style>
-          <a:lnRef idx="1">
-            <a:schemeClr val="accent1"/>
-          </a:lnRef>
-          <a:fillRef idx="0">
-            <a:schemeClr val="accent1"/>
-          </a:fillRef>
-          <a:effectRef idx="0">
-            <a:schemeClr val="accent1"/>
-          </a:effectRef>
-          <a:fontRef idx="minor">
-            <a:schemeClr val="tx1"/>
-          </a:fontRef>
-        </p:style>
-      </p:cxnSp>
-      <p:cxnSp>
-        <p:nvCxnSpPr>
-          <p:cNvPr id="14" name="직선 화살표 연결선 13">
-            <a:extLst>
-              <a:ext uri="{FF2B5EF4-FFF2-40B4-BE49-F238E27FC236}">
-                <a16:creationId xmlns:a16="http://schemas.microsoft.com/office/drawing/2014/main" id="{F92CEBBB-852B-0194-E311-D52F076265EE}"/>
-              </a:ext>
-            </a:extLst>
-          </p:cNvPr>
-          <p:cNvCxnSpPr>
-            <a:cxnSpLocks/>
-            <a:stCxn id="11" idx="2"/>
-            <a:endCxn id="10" idx="0"/>
-          </p:cNvCxnSpPr>
-          <p:nvPr/>
-        </p:nvCxnSpPr>
-        <p:spPr>
-          <a:xfrm>
-            <a:off x="3051663" y="2534963"/>
-            <a:ext cx="1445103" cy="473551"/>
-          </a:xfrm>
-          <a:prstGeom prst="straightConnector1">
-            <a:avLst/>
-          </a:prstGeom>
-          <a:ln>
-            <a:tailEnd type="triangle"/>
-          </a:ln>
-        </p:spPr>
-        <p:style>
-          <a:lnRef idx="1">
-            <a:schemeClr val="accent1"/>
-          </a:lnRef>
-          <a:fillRef idx="0">
-            <a:schemeClr val="accent1"/>
-          </a:fillRef>
-          <a:effectRef idx="0">
-            <a:schemeClr val="accent1"/>
-          </a:effectRef>
-          <a:fontRef idx="minor">
-            <a:schemeClr val="tx1"/>
-          </a:fontRef>
-        </p:style>
-      </p:cxnSp>
-      <p:cxnSp>
-        <p:nvCxnSpPr>
-          <p:cNvPr id="17" name="직선 화살표 연결선 16">
-            <a:extLst>
-              <a:ext uri="{FF2B5EF4-FFF2-40B4-BE49-F238E27FC236}">
-                <a16:creationId xmlns:a16="http://schemas.microsoft.com/office/drawing/2014/main" id="{98DC7BAD-5F6F-04A0-CA7C-B0722D92C2A1}"/>
-              </a:ext>
-            </a:extLst>
-          </p:cNvPr>
-          <p:cNvCxnSpPr>
-            <a:cxnSpLocks/>
-            <a:stCxn id="8" idx="2"/>
-            <a:endCxn id="11" idx="0"/>
-          </p:cNvCxnSpPr>
-          <p:nvPr/>
-        </p:nvCxnSpPr>
-        <p:spPr>
-          <a:xfrm flipH="1">
-            <a:off x="3051663" y="1678103"/>
-            <a:ext cx="839362" cy="610639"/>
-          </a:xfrm>
-          <a:prstGeom prst="straightConnector1">
-            <a:avLst/>
-          </a:prstGeom>
-          <a:ln>
-            <a:tailEnd type="triangle"/>
-          </a:ln>
-        </p:spPr>
-        <p:style>
-          <a:lnRef idx="1">
-            <a:schemeClr val="accent1"/>
-          </a:lnRef>
-          <a:fillRef idx="0">
-            <a:schemeClr val="accent1"/>
-          </a:fillRef>
-          <a:effectRef idx="0">
-            <a:schemeClr val="accent1"/>
-          </a:effectRef>
-          <a:fontRef idx="minor">
-            <a:schemeClr val="tx1"/>
-          </a:fontRef>
-        </p:style>
-      </p:cxnSp>
-      <p:cxnSp>
-        <p:nvCxnSpPr>
-          <p:cNvPr id="20" name="직선 화살표 연결선 19">
-            <a:extLst>
-              <a:ext uri="{FF2B5EF4-FFF2-40B4-BE49-F238E27FC236}">
-                <a16:creationId xmlns:a16="http://schemas.microsoft.com/office/drawing/2014/main" id="{BAABBC3E-D0B2-3BB2-E3E0-88E4AECF9A40}"/>
-              </a:ext>
-            </a:extLst>
-          </p:cNvPr>
-          <p:cNvCxnSpPr>
-            <a:cxnSpLocks/>
-            <a:stCxn id="8" idx="2"/>
-            <a:endCxn id="6" idx="0"/>
-          </p:cNvCxnSpPr>
-          <p:nvPr/>
-        </p:nvCxnSpPr>
-        <p:spPr>
-          <a:xfrm>
-            <a:off x="3891025" y="1678103"/>
-            <a:ext cx="1396828" cy="754229"/>
-          </a:xfrm>
-          <a:prstGeom prst="straightConnector1">
-            <a:avLst/>
-          </a:prstGeom>
-          <a:ln>
-            <a:tailEnd type="triangle"/>
-          </a:ln>
-        </p:spPr>
-        <p:style>
-          <a:lnRef idx="1">
-            <a:schemeClr val="accent1"/>
-          </a:lnRef>
-          <a:fillRef idx="0">
-            <a:schemeClr val="accent1"/>
-          </a:fillRef>
-          <a:effectRef idx="0">
-            <a:schemeClr val="accent1"/>
-          </a:effectRef>
-          <a:fontRef idx="minor">
-            <a:schemeClr val="tx1"/>
-          </a:fontRef>
-        </p:style>
-      </p:cxnSp>
-      <p:sp>
-        <p:nvSpPr>
-          <p:cNvPr id="27" name="TextBox 26">
-            <a:extLst>
-              <a:ext uri="{FF2B5EF4-FFF2-40B4-BE49-F238E27FC236}">
-                <a16:creationId xmlns:a16="http://schemas.microsoft.com/office/drawing/2014/main" id="{EE63D653-7C85-D673-7A6E-5121A53E8932}"/>
-              </a:ext>
-            </a:extLst>
-          </p:cNvPr>
-          <p:cNvSpPr txBox="1"/>
-          <p:nvPr/>
-        </p:nvSpPr>
-        <p:spPr>
-          <a:xfrm>
-            <a:off x="6110052" y="5255267"/>
-            <a:ext cx="1314784" cy="246221"/>
-          </a:xfrm>
-          <a:prstGeom prst="rect">
-            <a:avLst/>
-          </a:prstGeom>
-          <a:noFill/>
-          <a:ln w="19050">
-            <a:solidFill>
-              <a:srgbClr val="00B050"/>
-            </a:solidFill>
-          </a:ln>
-        </p:spPr>
-        <p:txBody>
-          <a:bodyPr wrap="none" rtlCol="0">
-            <a:spAutoFit/>
-          </a:bodyPr>
-          <a:lstStyle/>
-          <a:p>
-            <a:r>
-              <a:rPr lang="en-US" altLang="ko-KR" sz="1000" dirty="0">
-                <a:solidFill>
-                  <a:srgbClr val="000000"/>
-                </a:solidFill>
-                <a:latin typeface="Cascadia Mono" panose="020B0609020000020004" pitchFamily="49" charset="0"/>
-              </a:rPr>
-              <a:t>XgiLocalVar</a:t>
-            </a:r>
-            <a:r>
-              <a:rPr lang="en-US" altLang="ko-KR" sz="1000" dirty="0">
-                <a:solidFill>
-                  <a:srgbClr val="00B0F0"/>
-                </a:solidFill>
-                <a:latin typeface="Cascadia Mono" panose="020B0609020000020004" pitchFamily="49" charset="0"/>
-              </a:rPr>
-              <a:t>&lt;'T&gt;</a:t>
-            </a:r>
-            <a:endParaRPr lang="ko-KR" altLang="en-US" sz="1000" dirty="0">
-              <a:solidFill>
-                <a:srgbClr val="00B0F0"/>
-              </a:solidFill>
-            </a:endParaRPr>
-          </a:p>
-        </p:txBody>
-      </p:sp>
-      <p:sp>
-        <p:nvSpPr>
-          <p:cNvPr id="28" name="TextBox 27">
-            <a:extLst>
-              <a:ext uri="{FF2B5EF4-FFF2-40B4-BE49-F238E27FC236}">
-                <a16:creationId xmlns:a16="http://schemas.microsoft.com/office/drawing/2014/main" id="{AAEF26E9-2E6A-5264-53A4-30B28BE263F9}"/>
-              </a:ext>
-            </a:extLst>
-          </p:cNvPr>
-          <p:cNvSpPr txBox="1"/>
-          <p:nvPr/>
-        </p:nvSpPr>
-        <p:spPr>
-          <a:xfrm>
-            <a:off x="2578049" y="3936642"/>
-            <a:ext cx="1390124" cy="246221"/>
-          </a:xfrm>
-          <a:prstGeom prst="rect">
-            <a:avLst/>
-          </a:prstGeom>
-          <a:noFill/>
-          <a:ln w="19050">
-            <a:solidFill>
-              <a:srgbClr val="00B050"/>
-            </a:solidFill>
-          </a:ln>
-        </p:spPr>
-        <p:txBody>
-          <a:bodyPr wrap="none" rtlCol="0">
-            <a:spAutoFit/>
-          </a:bodyPr>
-          <a:lstStyle/>
-          <a:p>
-            <a:r>
-              <a:rPr lang="en-US" altLang="ko-KR" sz="1000" dirty="0">
-                <a:solidFill>
-                  <a:srgbClr val="000000"/>
-                </a:solidFill>
-                <a:latin typeface="Cascadia Mono" panose="020B0609020000020004" pitchFamily="49" charset="0"/>
-              </a:rPr>
-              <a:t>VariableBase</a:t>
-            </a:r>
-            <a:r>
-              <a:rPr lang="en-US" altLang="ko-KR" sz="1000" dirty="0">
-                <a:solidFill>
-                  <a:srgbClr val="00B0F0"/>
-                </a:solidFill>
-                <a:latin typeface="Cascadia Mono" panose="020B0609020000020004" pitchFamily="49" charset="0"/>
-              </a:rPr>
-              <a:t>&lt;'T&gt;</a:t>
-            </a:r>
-            <a:endParaRPr lang="ko-KR" altLang="en-US" sz="1000" dirty="0">
-              <a:solidFill>
-                <a:srgbClr val="00B0F0"/>
-              </a:solidFill>
-            </a:endParaRPr>
-          </a:p>
-        </p:txBody>
-      </p:sp>
-      <p:cxnSp>
-        <p:nvCxnSpPr>
-          <p:cNvPr id="30" name="직선 화살표 연결선 29">
-            <a:extLst>
-              <a:ext uri="{FF2B5EF4-FFF2-40B4-BE49-F238E27FC236}">
-                <a16:creationId xmlns:a16="http://schemas.microsoft.com/office/drawing/2014/main" id="{382EC6D5-E083-CD62-3041-DBBC3126200E}"/>
-              </a:ext>
-            </a:extLst>
-          </p:cNvPr>
-          <p:cNvCxnSpPr>
-            <a:stCxn id="28" idx="2"/>
-            <a:endCxn id="27" idx="0"/>
-          </p:cNvCxnSpPr>
-          <p:nvPr/>
-        </p:nvCxnSpPr>
-        <p:spPr>
-          <a:xfrm>
-            <a:off x="3273111" y="4182863"/>
-            <a:ext cx="3494333" cy="1072404"/>
-          </a:xfrm>
-          <a:prstGeom prst="straightConnector1">
-            <a:avLst/>
-          </a:prstGeom>
-          <a:ln>
-            <a:tailEnd type="triangle"/>
-          </a:ln>
-        </p:spPr>
-        <p:style>
-          <a:lnRef idx="1">
-            <a:schemeClr val="accent1"/>
-          </a:lnRef>
-          <a:fillRef idx="0">
-            <a:schemeClr val="accent1"/>
-          </a:fillRef>
-          <a:effectRef idx="0">
-            <a:schemeClr val="accent1"/>
-          </a:effectRef>
-          <a:fontRef idx="minor">
-            <a:schemeClr val="tx1"/>
-          </a:fontRef>
-        </p:style>
-      </p:cxnSp>
-      <p:cxnSp>
-        <p:nvCxnSpPr>
-          <p:cNvPr id="31" name="직선 화살표 연결선 30">
-            <a:extLst>
-              <a:ext uri="{FF2B5EF4-FFF2-40B4-BE49-F238E27FC236}">
-                <a16:creationId xmlns:a16="http://schemas.microsoft.com/office/drawing/2014/main" id="{498B3621-4E2B-686B-5556-5D4C40D7275B}"/>
-              </a:ext>
-            </a:extLst>
-          </p:cNvPr>
-          <p:cNvCxnSpPr>
-            <a:cxnSpLocks/>
-            <a:stCxn id="10" idx="2"/>
-            <a:endCxn id="27" idx="0"/>
-          </p:cNvCxnSpPr>
-          <p:nvPr/>
-        </p:nvCxnSpPr>
-        <p:spPr>
-          <a:xfrm>
-            <a:off x="4496766" y="3254735"/>
-            <a:ext cx="2270678" cy="2000532"/>
-          </a:xfrm>
-          <a:prstGeom prst="straightConnector1">
-            <a:avLst/>
-          </a:prstGeom>
-          <a:ln>
-            <a:tailEnd type="triangle"/>
-          </a:ln>
-        </p:spPr>
-        <p:style>
-          <a:lnRef idx="1">
-            <a:schemeClr val="accent1"/>
-          </a:lnRef>
-          <a:fillRef idx="0">
-            <a:schemeClr val="accent1"/>
-          </a:fillRef>
-          <a:effectRef idx="0">
-            <a:schemeClr val="accent1"/>
-          </a:effectRef>
-          <a:fontRef idx="minor">
-            <a:schemeClr val="tx1"/>
-          </a:fontRef>
-        </p:style>
-      </p:cxnSp>
-      <p:cxnSp>
-        <p:nvCxnSpPr>
-          <p:cNvPr id="34" name="직선 화살표 연결선 33">
-            <a:extLst>
-              <a:ext uri="{FF2B5EF4-FFF2-40B4-BE49-F238E27FC236}">
-                <a16:creationId xmlns:a16="http://schemas.microsoft.com/office/drawing/2014/main" id="{2C867B8E-BE1C-1FFD-D8B6-0DADE18BCD6D}"/>
-              </a:ext>
-            </a:extLst>
-          </p:cNvPr>
-          <p:cNvCxnSpPr>
-            <a:cxnSpLocks/>
-            <a:stCxn id="9" idx="2"/>
-            <a:endCxn id="27" idx="0"/>
-          </p:cNvCxnSpPr>
-          <p:nvPr/>
-        </p:nvCxnSpPr>
-        <p:spPr>
-          <a:xfrm flipH="1">
-            <a:off x="6767444" y="1479622"/>
-            <a:ext cx="1" cy="3775645"/>
-          </a:xfrm>
-          <a:prstGeom prst="straightConnector1">
-            <a:avLst/>
-          </a:prstGeom>
-          <a:ln>
-            <a:tailEnd type="triangle"/>
-          </a:ln>
-        </p:spPr>
-        <p:style>
-          <a:lnRef idx="1">
-            <a:schemeClr val="accent1"/>
-          </a:lnRef>
-          <a:fillRef idx="0">
-            <a:schemeClr val="accent1"/>
-          </a:fillRef>
-          <a:effectRef idx="0">
-            <a:schemeClr val="accent1"/>
-          </a:effectRef>
-          <a:fontRef idx="minor">
-            <a:schemeClr val="tx1"/>
-          </a:fontRef>
-        </p:style>
-      </p:cxnSp>
-      <p:sp>
-        <p:nvSpPr>
-          <p:cNvPr id="37" name="TextBox 36">
-            <a:extLst>
-              <a:ext uri="{FF2B5EF4-FFF2-40B4-BE49-F238E27FC236}">
-                <a16:creationId xmlns:a16="http://schemas.microsoft.com/office/drawing/2014/main" id="{FEB9102F-EA30-1497-99A0-D348FECAE76B}"/>
-              </a:ext>
-            </a:extLst>
-          </p:cNvPr>
-          <p:cNvSpPr txBox="1"/>
-          <p:nvPr/>
-        </p:nvSpPr>
-        <p:spPr>
-          <a:xfrm>
-            <a:off x="3598600" y="192245"/>
-            <a:ext cx="561372" cy="246221"/>
-          </a:xfrm>
-          <a:prstGeom prst="rect">
-            <a:avLst/>
-          </a:prstGeom>
-          <a:noFill/>
-          <a:ln>
-            <a:solidFill>
-              <a:schemeClr val="tx1"/>
-            </a:solidFill>
-          </a:ln>
-        </p:spPr>
-        <p:txBody>
-          <a:bodyPr wrap="none" rtlCol="0">
-            <a:spAutoFit/>
-          </a:bodyPr>
-          <a:lstStyle/>
-          <a:p>
-            <a:r>
-              <a:rPr lang="en-US" altLang="ko-KR" sz="1000" dirty="0">
-                <a:solidFill>
-                  <a:srgbClr val="000000"/>
-                </a:solidFill>
-                <a:latin typeface="Cascadia Mono" panose="020B0609020000020004" pitchFamily="49" charset="0"/>
-              </a:rPr>
-              <a:t>IText</a:t>
-            </a:r>
-            <a:endParaRPr lang="ko-KR" altLang="en-US" sz="1000" dirty="0"/>
-          </a:p>
-        </p:txBody>
-      </p:sp>
-      <p:cxnSp>
-        <p:nvCxnSpPr>
-          <p:cNvPr id="48" name="직선 화살표 연결선 47">
-            <a:extLst>
-              <a:ext uri="{FF2B5EF4-FFF2-40B4-BE49-F238E27FC236}">
-                <a16:creationId xmlns:a16="http://schemas.microsoft.com/office/drawing/2014/main" id="{65A10150-96B4-16D3-BCE7-EAEFE083FD9F}"/>
-              </a:ext>
-            </a:extLst>
-          </p:cNvPr>
-          <p:cNvCxnSpPr>
-            <a:cxnSpLocks/>
-            <a:stCxn id="9" idx="2"/>
-            <a:endCxn id="6" idx="0"/>
-          </p:cNvCxnSpPr>
-          <p:nvPr/>
-        </p:nvCxnSpPr>
-        <p:spPr>
-          <a:xfrm flipH="1">
-            <a:off x="5287853" y="1479622"/>
-            <a:ext cx="1479592" cy="952710"/>
-          </a:xfrm>
-          <a:prstGeom prst="straightConnector1">
-            <a:avLst/>
-          </a:prstGeom>
-          <a:ln>
-            <a:tailEnd type="triangle"/>
-          </a:ln>
-        </p:spPr>
-        <p:style>
-          <a:lnRef idx="1">
-            <a:schemeClr val="accent1"/>
-          </a:lnRef>
-          <a:fillRef idx="0">
-            <a:schemeClr val="accent1"/>
-          </a:fillRef>
-          <a:effectRef idx="0">
-            <a:schemeClr val="accent1"/>
-          </a:effectRef>
-          <a:fontRef idx="minor">
-            <a:schemeClr val="tx1"/>
-          </a:fontRef>
-        </p:style>
-      </p:cxnSp>
-      <p:sp>
-        <p:nvSpPr>
-          <p:cNvPr id="52" name="TextBox 51">
-            <a:extLst>
-              <a:ext uri="{FF2B5EF4-FFF2-40B4-BE49-F238E27FC236}">
-                <a16:creationId xmlns:a16="http://schemas.microsoft.com/office/drawing/2014/main" id="{3D3687EB-93D7-C2CC-B313-FCC0D5D7A37A}"/>
-              </a:ext>
-            </a:extLst>
-          </p:cNvPr>
-          <p:cNvSpPr txBox="1"/>
-          <p:nvPr/>
-        </p:nvSpPr>
-        <p:spPr>
-          <a:xfrm>
-            <a:off x="5733347" y="718082"/>
-            <a:ext cx="2068195" cy="246221"/>
-          </a:xfrm>
-          <a:prstGeom prst="rect">
-            <a:avLst/>
-          </a:prstGeom>
-          <a:noFill/>
-          <a:ln>
-            <a:solidFill>
-              <a:schemeClr val="tx1"/>
-            </a:solidFill>
-          </a:ln>
-        </p:spPr>
-        <p:txBody>
-          <a:bodyPr wrap="none" rtlCol="0">
-            <a:spAutoFit/>
-          </a:bodyPr>
-          <a:lstStyle/>
-          <a:p>
-            <a:r>
-              <a:rPr lang="en-US" altLang="ko-KR" sz="1000" dirty="0">
-                <a:solidFill>
-                  <a:srgbClr val="000000"/>
-                </a:solidFill>
-                <a:latin typeface="Cascadia Mono" panose="020B0609020000020004" pitchFamily="49" charset="0"/>
-              </a:rPr>
-              <a:t>IExpressionizableTerminal</a:t>
-            </a:r>
-            <a:endParaRPr lang="ko-KR" altLang="en-US" sz="1000" dirty="0"/>
-          </a:p>
-        </p:txBody>
-      </p:sp>
-      <p:cxnSp>
-        <p:nvCxnSpPr>
-          <p:cNvPr id="53" name="직선 화살표 연결선 52">
-            <a:extLst>
-              <a:ext uri="{FF2B5EF4-FFF2-40B4-BE49-F238E27FC236}">
-                <a16:creationId xmlns:a16="http://schemas.microsoft.com/office/drawing/2014/main" id="{C6C10E57-F821-79CD-5DE2-00D3470854E7}"/>
-              </a:ext>
-            </a:extLst>
-          </p:cNvPr>
-          <p:cNvCxnSpPr>
-            <a:cxnSpLocks/>
-            <a:stCxn id="52" idx="2"/>
-            <a:endCxn id="9" idx="0"/>
-          </p:cNvCxnSpPr>
-          <p:nvPr/>
-        </p:nvCxnSpPr>
-        <p:spPr>
-          <a:xfrm>
-            <a:off x="6767445" y="964303"/>
-            <a:ext cx="0" cy="269098"/>
-          </a:xfrm>
-          <a:prstGeom prst="straightConnector1">
-            <a:avLst/>
-          </a:prstGeom>
-          <a:ln>
-            <a:tailEnd type="triangle"/>
-          </a:ln>
-        </p:spPr>
-        <p:style>
-          <a:lnRef idx="1">
-            <a:schemeClr val="accent1"/>
-          </a:lnRef>
-          <a:fillRef idx="0">
-            <a:schemeClr val="accent1"/>
-          </a:fillRef>
-          <a:effectRef idx="0">
-            <a:schemeClr val="accent1"/>
-          </a:effectRef>
-          <a:fontRef idx="minor">
-            <a:schemeClr val="tx1"/>
-          </a:fontRef>
-        </p:style>
-      </p:cxnSp>
-      <p:cxnSp>
-        <p:nvCxnSpPr>
-          <p:cNvPr id="58" name="직선 화살표 연결선 57">
-            <a:extLst>
-              <a:ext uri="{FF2B5EF4-FFF2-40B4-BE49-F238E27FC236}">
-                <a16:creationId xmlns:a16="http://schemas.microsoft.com/office/drawing/2014/main" id="{39ECDEE4-FFA3-FB7B-F758-1FF8A9342BE4}"/>
-              </a:ext>
-            </a:extLst>
-          </p:cNvPr>
-          <p:cNvCxnSpPr>
-            <a:stCxn id="37" idx="2"/>
-            <a:endCxn id="52" idx="0"/>
-          </p:cNvCxnSpPr>
-          <p:nvPr/>
-        </p:nvCxnSpPr>
-        <p:spPr>
-          <a:xfrm>
-            <a:off x="3879286" y="438466"/>
-            <a:ext cx="2888159" cy="279616"/>
-          </a:xfrm>
-          <a:prstGeom prst="straightConnector1">
-            <a:avLst/>
-          </a:prstGeom>
-          <a:ln>
-            <a:tailEnd type="triangle"/>
-          </a:ln>
-        </p:spPr>
-        <p:style>
-          <a:lnRef idx="1">
-            <a:schemeClr val="accent1"/>
-          </a:lnRef>
-          <a:fillRef idx="0">
-            <a:schemeClr val="accent1"/>
-          </a:fillRef>
-          <a:effectRef idx="0">
-            <a:schemeClr val="accent1"/>
-          </a:effectRef>
-          <a:fontRef idx="minor">
-            <a:schemeClr val="tx1"/>
-          </a:fontRef>
-        </p:style>
-      </p:cxnSp>
-      <p:sp>
-        <p:nvSpPr>
-          <p:cNvPr id="60" name="TextBox 59">
-            <a:extLst>
-              <a:ext uri="{FF2B5EF4-FFF2-40B4-BE49-F238E27FC236}">
-                <a16:creationId xmlns:a16="http://schemas.microsoft.com/office/drawing/2014/main" id="{63CE6C21-2084-F8BC-7970-57A3184D32A1}"/>
-              </a:ext>
-            </a:extLst>
-          </p:cNvPr>
-          <p:cNvSpPr txBox="1"/>
-          <p:nvPr/>
-        </p:nvSpPr>
-        <p:spPr>
-          <a:xfrm>
-            <a:off x="603432" y="1438961"/>
-            <a:ext cx="1088760" cy="246221"/>
-          </a:xfrm>
-          <a:prstGeom prst="rect">
-            <a:avLst/>
-          </a:prstGeom>
-          <a:noFill/>
-          <a:ln>
-            <a:solidFill>
-              <a:schemeClr val="tx1"/>
-            </a:solidFill>
-          </a:ln>
-        </p:spPr>
-        <p:txBody>
-          <a:bodyPr wrap="none" rtlCol="0">
-            <a:spAutoFit/>
-          </a:bodyPr>
-          <a:lstStyle/>
-          <a:p>
-            <a:r>
-              <a:rPr lang="en-US" altLang="ko-KR" sz="1000" dirty="0">
-                <a:solidFill>
-                  <a:srgbClr val="000000"/>
-                </a:solidFill>
-                <a:latin typeface="Cascadia Mono" panose="020B0609020000020004" pitchFamily="49" charset="0"/>
-              </a:rPr>
-              <a:t>IStorage</a:t>
-            </a:r>
-            <a:r>
-              <a:rPr lang="en-US" altLang="ko-KR" sz="1000" dirty="0">
-                <a:solidFill>
-                  <a:srgbClr val="00B0F0"/>
-                </a:solidFill>
-                <a:latin typeface="Cascadia Mono" panose="020B0609020000020004" pitchFamily="49" charset="0"/>
-              </a:rPr>
-              <a:t>&lt;'T&gt;</a:t>
-            </a:r>
-            <a:endParaRPr lang="ko-KR" altLang="en-US" sz="1000" dirty="0"/>
-          </a:p>
-        </p:txBody>
-      </p:sp>
-      <p:cxnSp>
-        <p:nvCxnSpPr>
-          <p:cNvPr id="61" name="직선 화살표 연결선 60">
-            <a:extLst>
-              <a:ext uri="{FF2B5EF4-FFF2-40B4-BE49-F238E27FC236}">
-                <a16:creationId xmlns:a16="http://schemas.microsoft.com/office/drawing/2014/main" id="{30F3F1BC-4018-8E92-1AC4-02581426101C}"/>
-              </a:ext>
-            </a:extLst>
-          </p:cNvPr>
-          <p:cNvCxnSpPr>
-            <a:cxnSpLocks/>
-            <a:stCxn id="37" idx="2"/>
-            <a:endCxn id="102" idx="0"/>
-          </p:cNvCxnSpPr>
-          <p:nvPr/>
-        </p:nvCxnSpPr>
-        <p:spPr>
-          <a:xfrm flipH="1">
-            <a:off x="2451492" y="438466"/>
-            <a:ext cx="1427794" cy="279616"/>
-          </a:xfrm>
-          <a:prstGeom prst="straightConnector1">
-            <a:avLst/>
-          </a:prstGeom>
-          <a:ln>
-            <a:tailEnd type="triangle"/>
-          </a:ln>
-        </p:spPr>
-        <p:style>
-          <a:lnRef idx="1">
-            <a:schemeClr val="accent1"/>
-          </a:lnRef>
-          <a:fillRef idx="0">
-            <a:schemeClr val="accent1"/>
-          </a:fillRef>
-          <a:effectRef idx="0">
-            <a:schemeClr val="accent1"/>
-          </a:effectRef>
-          <a:fontRef idx="minor">
-            <a:schemeClr val="tx1"/>
-          </a:fontRef>
-        </p:style>
-      </p:cxnSp>
-      <p:sp>
-        <p:nvSpPr>
-          <p:cNvPr id="63" name="TextBox 62">
-            <a:extLst>
-              <a:ext uri="{FF2B5EF4-FFF2-40B4-BE49-F238E27FC236}">
-                <a16:creationId xmlns:a16="http://schemas.microsoft.com/office/drawing/2014/main" id="{5C190661-FCB0-645E-E2D6-AE19FA1918DA}"/>
-              </a:ext>
-            </a:extLst>
-          </p:cNvPr>
-          <p:cNvSpPr txBox="1"/>
-          <p:nvPr/>
-        </p:nvSpPr>
-        <p:spPr>
-          <a:xfrm>
-            <a:off x="2264396" y="172524"/>
-            <a:ext cx="636713" cy="246221"/>
-          </a:xfrm>
-          <a:prstGeom prst="rect">
-            <a:avLst/>
-          </a:prstGeom>
-          <a:noFill/>
-          <a:ln>
-            <a:solidFill>
-              <a:schemeClr val="tx1"/>
-            </a:solidFill>
-          </a:ln>
-        </p:spPr>
-        <p:txBody>
-          <a:bodyPr wrap="none" rtlCol="0">
-            <a:spAutoFit/>
-          </a:bodyPr>
-          <a:lstStyle/>
-          <a:p>
-            <a:r>
-              <a:rPr lang="en-US" altLang="ko-KR" sz="1000" dirty="0">
-                <a:solidFill>
-                  <a:srgbClr val="000000"/>
-                </a:solidFill>
-                <a:latin typeface="Cascadia Mono" panose="020B0609020000020004" pitchFamily="49" charset="0"/>
-              </a:rPr>
-              <a:t>INamed</a:t>
-            </a:r>
-            <a:endParaRPr lang="ko-KR" altLang="en-US" sz="1000" dirty="0"/>
-          </a:p>
-        </p:txBody>
-      </p:sp>
-      <p:cxnSp>
-        <p:nvCxnSpPr>
-          <p:cNvPr id="64" name="직선 화살표 연결선 63">
-            <a:extLst>
-              <a:ext uri="{FF2B5EF4-FFF2-40B4-BE49-F238E27FC236}">
-                <a16:creationId xmlns:a16="http://schemas.microsoft.com/office/drawing/2014/main" id="{C2F03666-F95F-D260-B799-5452D9B81E0B}"/>
-              </a:ext>
-            </a:extLst>
-          </p:cNvPr>
-          <p:cNvCxnSpPr>
-            <a:cxnSpLocks/>
-            <a:stCxn id="63" idx="2"/>
-            <a:endCxn id="102" idx="0"/>
-          </p:cNvCxnSpPr>
-          <p:nvPr/>
-        </p:nvCxnSpPr>
-        <p:spPr>
-          <a:xfrm flipH="1">
-            <a:off x="2451492" y="418745"/>
-            <a:ext cx="131261" cy="299337"/>
-          </a:xfrm>
-          <a:prstGeom prst="straightConnector1">
-            <a:avLst/>
-          </a:prstGeom>
-          <a:ln>
-            <a:tailEnd type="triangle"/>
-          </a:ln>
-        </p:spPr>
-        <p:style>
-          <a:lnRef idx="1">
-            <a:schemeClr val="accent1"/>
-          </a:lnRef>
-          <a:fillRef idx="0">
-            <a:schemeClr val="accent1"/>
-          </a:fillRef>
-          <a:effectRef idx="0">
-            <a:schemeClr val="accent1"/>
-          </a:effectRef>
-          <a:fontRef idx="minor">
-            <a:schemeClr val="tx1"/>
-          </a:fontRef>
-        </p:style>
-      </p:cxnSp>
-      <p:sp>
-        <p:nvSpPr>
-          <p:cNvPr id="67" name="TextBox 66">
-            <a:extLst>
-              <a:ext uri="{FF2B5EF4-FFF2-40B4-BE49-F238E27FC236}">
-                <a16:creationId xmlns:a16="http://schemas.microsoft.com/office/drawing/2014/main" id="{72142CA8-6FE7-EBD2-3EAC-4CDBD99E5F0C}"/>
-              </a:ext>
-            </a:extLst>
-          </p:cNvPr>
-          <p:cNvSpPr txBox="1"/>
-          <p:nvPr/>
-        </p:nvSpPr>
-        <p:spPr>
-          <a:xfrm>
-            <a:off x="3080706" y="5593473"/>
-            <a:ext cx="712054" cy="246221"/>
-          </a:xfrm>
-          <a:prstGeom prst="rect">
-            <a:avLst/>
-          </a:prstGeom>
-          <a:noFill/>
-          <a:ln w="19050">
-            <a:solidFill>
-              <a:srgbClr val="00B050"/>
-            </a:solidFill>
-          </a:ln>
-        </p:spPr>
-        <p:txBody>
-          <a:bodyPr wrap="none" rtlCol="0">
-            <a:spAutoFit/>
-          </a:bodyPr>
-          <a:lstStyle/>
-          <a:p>
-            <a:r>
-              <a:rPr lang="en-US" altLang="ko-KR" sz="1000" dirty="0">
-                <a:solidFill>
-                  <a:srgbClr val="000000"/>
-                </a:solidFill>
-                <a:latin typeface="Cascadia Mono" panose="020B0609020000020004" pitchFamily="49" charset="0"/>
-              </a:rPr>
-              <a:t>Tag</a:t>
-            </a:r>
-            <a:r>
-              <a:rPr lang="en-US" altLang="ko-KR" sz="1000" dirty="0">
-                <a:solidFill>
-                  <a:srgbClr val="00B0F0"/>
-                </a:solidFill>
-                <a:latin typeface="Cascadia Mono" panose="020B0609020000020004" pitchFamily="49" charset="0"/>
-              </a:rPr>
-              <a:t>&lt;'T&gt;</a:t>
-            </a:r>
-            <a:endParaRPr lang="ko-KR" altLang="en-US" sz="1000" dirty="0">
-              <a:solidFill>
-                <a:srgbClr val="00B0F0"/>
-              </a:solidFill>
-            </a:endParaRPr>
-          </a:p>
-        </p:txBody>
-      </p:sp>
-      <p:sp>
-        <p:nvSpPr>
-          <p:cNvPr id="68" name="TextBox 67">
-            <a:extLst>
-              <a:ext uri="{FF2B5EF4-FFF2-40B4-BE49-F238E27FC236}">
-                <a16:creationId xmlns:a16="http://schemas.microsoft.com/office/drawing/2014/main" id="{7932BBC8-60DE-74E2-5F28-931E0EDE0D90}"/>
-              </a:ext>
-            </a:extLst>
-          </p:cNvPr>
-          <p:cNvSpPr txBox="1"/>
-          <p:nvPr/>
-        </p:nvSpPr>
-        <p:spPr>
-          <a:xfrm>
-            <a:off x="2932264" y="4957692"/>
-            <a:ext cx="1013419" cy="246221"/>
-          </a:xfrm>
-          <a:prstGeom prst="rect">
-            <a:avLst/>
-          </a:prstGeom>
-          <a:noFill/>
-          <a:ln w="19050">
-            <a:solidFill>
-              <a:srgbClr val="00B050"/>
-            </a:solidFill>
-          </a:ln>
-        </p:spPr>
-        <p:txBody>
-          <a:bodyPr wrap="none" rtlCol="0">
-            <a:spAutoFit/>
-          </a:bodyPr>
-          <a:lstStyle/>
-          <a:p>
-            <a:r>
-              <a:rPr lang="en-US" altLang="ko-KR" sz="1000" dirty="0">
-                <a:solidFill>
-                  <a:srgbClr val="000000"/>
-                </a:solidFill>
-                <a:latin typeface="Cascadia Mono" panose="020B0609020000020004" pitchFamily="49" charset="0"/>
-              </a:rPr>
-              <a:t>TagBase</a:t>
-            </a:r>
-            <a:r>
-              <a:rPr lang="en-US" altLang="ko-KR" sz="1000" dirty="0">
-                <a:solidFill>
-                  <a:srgbClr val="00B0F0"/>
-                </a:solidFill>
-                <a:latin typeface="Cascadia Mono" panose="020B0609020000020004" pitchFamily="49" charset="0"/>
-              </a:rPr>
-              <a:t>&lt;'T&gt;</a:t>
-            </a:r>
-            <a:endParaRPr lang="ko-KR" altLang="en-US" sz="1000" dirty="0">
-              <a:solidFill>
-                <a:srgbClr val="00B0F0"/>
-              </a:solidFill>
-            </a:endParaRPr>
-          </a:p>
-        </p:txBody>
-      </p:sp>
-      <p:cxnSp>
-        <p:nvCxnSpPr>
-          <p:cNvPr id="69" name="직선 화살표 연결선 68">
-            <a:extLst>
-              <a:ext uri="{FF2B5EF4-FFF2-40B4-BE49-F238E27FC236}">
-                <a16:creationId xmlns:a16="http://schemas.microsoft.com/office/drawing/2014/main" id="{63C171F0-7128-EF09-DE03-DEBEC8B446E6}"/>
-              </a:ext>
-            </a:extLst>
-          </p:cNvPr>
-          <p:cNvCxnSpPr>
-            <a:stCxn id="68" idx="2"/>
-            <a:endCxn id="67" idx="0"/>
-          </p:cNvCxnSpPr>
-          <p:nvPr/>
-        </p:nvCxnSpPr>
-        <p:spPr>
-          <a:xfrm flipH="1">
-            <a:off x="3436733" y="5203913"/>
-            <a:ext cx="2241" cy="389560"/>
-          </a:xfrm>
-          <a:prstGeom prst="straightConnector1">
-            <a:avLst/>
-          </a:prstGeom>
-          <a:ln>
-            <a:tailEnd type="triangle"/>
-          </a:ln>
-        </p:spPr>
-        <p:style>
-          <a:lnRef idx="1">
-            <a:schemeClr val="accent1"/>
-          </a:lnRef>
-          <a:fillRef idx="0">
-            <a:schemeClr val="accent1"/>
-          </a:fillRef>
-          <a:effectRef idx="0">
-            <a:schemeClr val="accent1"/>
-          </a:effectRef>
-          <a:fontRef idx="minor">
-            <a:schemeClr val="tx1"/>
-          </a:fontRef>
-        </p:style>
-      </p:cxnSp>
-      <p:sp>
-        <p:nvSpPr>
-          <p:cNvPr id="71" name="TextBox 70">
-            <a:extLst>
-              <a:ext uri="{FF2B5EF4-FFF2-40B4-BE49-F238E27FC236}">
-                <a16:creationId xmlns:a16="http://schemas.microsoft.com/office/drawing/2014/main" id="{6794E372-350F-EDB8-AF1E-95FC5E851FB5}"/>
-              </a:ext>
-            </a:extLst>
-          </p:cNvPr>
-          <p:cNvSpPr txBox="1"/>
-          <p:nvPr/>
-        </p:nvSpPr>
-        <p:spPr>
-          <a:xfrm>
-            <a:off x="600093" y="5289655"/>
-            <a:ext cx="1088760" cy="246221"/>
-          </a:xfrm>
-          <a:prstGeom prst="rect">
-            <a:avLst/>
-          </a:prstGeom>
-          <a:noFill/>
-          <a:ln w="19050">
-            <a:solidFill>
-              <a:srgbClr val="00B050"/>
-            </a:solidFill>
-          </a:ln>
-        </p:spPr>
-        <p:txBody>
-          <a:bodyPr wrap="none" rtlCol="0">
-            <a:spAutoFit/>
-          </a:bodyPr>
-          <a:lstStyle/>
-          <a:p>
-            <a:r>
-              <a:rPr lang="en-US" altLang="ko-KR" sz="1000" dirty="0">
-                <a:solidFill>
-                  <a:srgbClr val="000000"/>
-                </a:solidFill>
-                <a:latin typeface="Cascadia Mono" panose="020B0609020000020004" pitchFamily="49" charset="0"/>
-              </a:rPr>
-              <a:t>Variable</a:t>
-            </a:r>
-            <a:r>
-              <a:rPr lang="en-US" altLang="ko-KR" sz="1000" dirty="0">
-                <a:solidFill>
-                  <a:srgbClr val="00B0F0"/>
-                </a:solidFill>
-                <a:latin typeface="Cascadia Mono" panose="020B0609020000020004" pitchFamily="49" charset="0"/>
-              </a:rPr>
-              <a:t>&lt;'T&gt;</a:t>
-            </a:r>
-            <a:endParaRPr lang="ko-KR" altLang="en-US" sz="1000" dirty="0">
-              <a:solidFill>
-                <a:srgbClr val="00B0F0"/>
-              </a:solidFill>
-            </a:endParaRPr>
-          </a:p>
-        </p:txBody>
-      </p:sp>
-      <p:cxnSp>
-        <p:nvCxnSpPr>
-          <p:cNvPr id="72" name="직선 화살표 연결선 71">
-            <a:extLst>
-              <a:ext uri="{FF2B5EF4-FFF2-40B4-BE49-F238E27FC236}">
-                <a16:creationId xmlns:a16="http://schemas.microsoft.com/office/drawing/2014/main" id="{928930EF-EA35-098E-A247-759F0856EA35}"/>
-              </a:ext>
-            </a:extLst>
-          </p:cNvPr>
-          <p:cNvCxnSpPr>
-            <a:cxnSpLocks/>
-            <a:stCxn id="73" idx="2"/>
-            <a:endCxn id="71" idx="0"/>
-          </p:cNvCxnSpPr>
-          <p:nvPr/>
-        </p:nvCxnSpPr>
-        <p:spPr>
-          <a:xfrm>
-            <a:off x="1144473" y="4757322"/>
-            <a:ext cx="0" cy="532333"/>
-          </a:xfrm>
-          <a:prstGeom prst="straightConnector1">
-            <a:avLst/>
-          </a:prstGeom>
-          <a:ln>
-            <a:tailEnd type="triangle"/>
-          </a:ln>
-        </p:spPr>
-        <p:style>
-          <a:lnRef idx="1">
-            <a:schemeClr val="accent1"/>
-          </a:lnRef>
-          <a:fillRef idx="0">
-            <a:schemeClr val="accent1"/>
-          </a:fillRef>
-          <a:effectRef idx="0">
-            <a:schemeClr val="accent1"/>
-          </a:effectRef>
-          <a:fontRef idx="minor">
-            <a:schemeClr val="tx1"/>
-          </a:fontRef>
-        </p:style>
-      </p:cxnSp>
-      <p:sp>
-        <p:nvSpPr>
-          <p:cNvPr id="73" name="TextBox 72">
-            <a:extLst>
-              <a:ext uri="{FF2B5EF4-FFF2-40B4-BE49-F238E27FC236}">
-                <a16:creationId xmlns:a16="http://schemas.microsoft.com/office/drawing/2014/main" id="{023B7543-0D1E-935E-8C4B-43BCE9778FA6}"/>
-              </a:ext>
-            </a:extLst>
-          </p:cNvPr>
-          <p:cNvSpPr txBox="1"/>
-          <p:nvPr/>
-        </p:nvSpPr>
-        <p:spPr>
-          <a:xfrm>
-            <a:off x="449411" y="4511101"/>
-            <a:ext cx="1390124" cy="246221"/>
-          </a:xfrm>
-          <a:prstGeom prst="rect">
-            <a:avLst/>
-          </a:prstGeom>
-          <a:noFill/>
-          <a:ln w="19050">
-            <a:solidFill>
-              <a:srgbClr val="00B050"/>
-            </a:solidFill>
-          </a:ln>
-        </p:spPr>
-        <p:txBody>
-          <a:bodyPr wrap="none" rtlCol="0">
-            <a:spAutoFit/>
-          </a:bodyPr>
-          <a:lstStyle/>
-          <a:p>
-            <a:r>
-              <a:rPr lang="en-US" altLang="ko-KR" sz="1000" dirty="0">
-                <a:solidFill>
-                  <a:srgbClr val="000000"/>
-                </a:solidFill>
-                <a:latin typeface="Cascadia Mono" panose="020B0609020000020004" pitchFamily="49" charset="0"/>
-              </a:rPr>
-              <a:t>VariableBase</a:t>
-            </a:r>
-            <a:r>
-              <a:rPr lang="en-US" altLang="ko-KR" sz="1000" dirty="0">
-                <a:solidFill>
-                  <a:srgbClr val="00B0F0"/>
-                </a:solidFill>
-                <a:latin typeface="Cascadia Mono" panose="020B0609020000020004" pitchFamily="49" charset="0"/>
-              </a:rPr>
-              <a:t>&lt;'T&gt;</a:t>
-            </a:r>
-            <a:endParaRPr lang="ko-KR" altLang="en-US" sz="1000" dirty="0">
-              <a:solidFill>
-                <a:srgbClr val="00B0F0"/>
-              </a:solidFill>
-            </a:endParaRPr>
-          </a:p>
-        </p:txBody>
-      </p:sp>
-      <p:sp>
-        <p:nvSpPr>
-          <p:cNvPr id="77" name="TextBox 76">
-            <a:extLst>
-              <a:ext uri="{FF2B5EF4-FFF2-40B4-BE49-F238E27FC236}">
-                <a16:creationId xmlns:a16="http://schemas.microsoft.com/office/drawing/2014/main" id="{2F398354-4D67-0290-0FBC-6D3AEDEF7E80}"/>
-              </a:ext>
-            </a:extLst>
-          </p:cNvPr>
-          <p:cNvSpPr txBox="1"/>
-          <p:nvPr/>
-        </p:nvSpPr>
-        <p:spPr>
-          <a:xfrm>
-            <a:off x="2967694" y="6197052"/>
-            <a:ext cx="938077" cy="246221"/>
-          </a:xfrm>
-          <a:prstGeom prst="rect">
-            <a:avLst/>
-          </a:prstGeom>
-          <a:noFill/>
-          <a:ln w="19050">
-            <a:solidFill>
-              <a:srgbClr val="00B050"/>
-            </a:solidFill>
-          </a:ln>
-        </p:spPr>
-        <p:txBody>
-          <a:bodyPr wrap="none" rtlCol="0">
-            <a:spAutoFit/>
-          </a:bodyPr>
-          <a:lstStyle/>
-          <a:p>
-            <a:r>
-              <a:rPr lang="en-US" altLang="ko-KR" sz="1000" dirty="0">
-                <a:solidFill>
-                  <a:srgbClr val="000000"/>
-                </a:solidFill>
-                <a:latin typeface="Cascadia Mono" panose="020B0609020000020004" pitchFamily="49" charset="0"/>
-              </a:rPr>
-              <a:t>PlcTag</a:t>
-            </a:r>
-            <a:r>
-              <a:rPr lang="en-US" altLang="ko-KR" sz="1000" dirty="0">
-                <a:solidFill>
-                  <a:srgbClr val="00B0F0"/>
-                </a:solidFill>
-                <a:latin typeface="Cascadia Mono" panose="020B0609020000020004" pitchFamily="49" charset="0"/>
-              </a:rPr>
-              <a:t>&lt;'T&gt;</a:t>
-            </a:r>
-            <a:endParaRPr lang="ko-KR" altLang="en-US" sz="1000" dirty="0">
-              <a:solidFill>
-                <a:srgbClr val="00B0F0"/>
-              </a:solidFill>
-            </a:endParaRPr>
-          </a:p>
-        </p:txBody>
-      </p:sp>
-      <p:cxnSp>
-        <p:nvCxnSpPr>
-          <p:cNvPr id="78" name="직선 화살표 연결선 77">
-            <a:extLst>
-              <a:ext uri="{FF2B5EF4-FFF2-40B4-BE49-F238E27FC236}">
-                <a16:creationId xmlns:a16="http://schemas.microsoft.com/office/drawing/2014/main" id="{410F0AAE-65E9-76F9-585F-422391B1CF44}"/>
-              </a:ext>
-            </a:extLst>
-          </p:cNvPr>
-          <p:cNvCxnSpPr>
-            <a:cxnSpLocks/>
-            <a:stCxn id="67" idx="2"/>
-            <a:endCxn id="77" idx="0"/>
-          </p:cNvCxnSpPr>
-          <p:nvPr/>
-        </p:nvCxnSpPr>
-        <p:spPr>
-          <a:xfrm>
-            <a:off x="3436733" y="5839694"/>
-            <a:ext cx="0" cy="357358"/>
-          </a:xfrm>
-          <a:prstGeom prst="straightConnector1">
-            <a:avLst/>
-          </a:prstGeom>
-          <a:ln>
-            <a:tailEnd type="triangle"/>
-          </a:ln>
-        </p:spPr>
-        <p:style>
-          <a:lnRef idx="1">
-            <a:schemeClr val="accent1"/>
-          </a:lnRef>
-          <a:fillRef idx="0">
-            <a:schemeClr val="accent1"/>
-          </a:fillRef>
-          <a:effectRef idx="0">
-            <a:schemeClr val="accent1"/>
-          </a:effectRef>
-          <a:fontRef idx="minor">
-            <a:schemeClr val="tx1"/>
-          </a:fontRef>
-        </p:style>
-      </p:cxnSp>
-      <p:cxnSp>
-        <p:nvCxnSpPr>
-          <p:cNvPr id="81" name="직선 화살표 연결선 80">
-            <a:extLst>
-              <a:ext uri="{FF2B5EF4-FFF2-40B4-BE49-F238E27FC236}">
-                <a16:creationId xmlns:a16="http://schemas.microsoft.com/office/drawing/2014/main" id="{CDB45B25-D6AF-FB74-A034-BE98422A3408}"/>
-              </a:ext>
-            </a:extLst>
-          </p:cNvPr>
-          <p:cNvCxnSpPr>
-            <a:cxnSpLocks/>
-            <a:stCxn id="82" idx="2"/>
-            <a:endCxn id="73" idx="0"/>
-          </p:cNvCxnSpPr>
-          <p:nvPr/>
-        </p:nvCxnSpPr>
-        <p:spPr>
-          <a:xfrm flipH="1">
-            <a:off x="1144473" y="3556013"/>
-            <a:ext cx="1" cy="955088"/>
-          </a:xfrm>
-          <a:prstGeom prst="straightConnector1">
-            <a:avLst/>
-          </a:prstGeom>
-          <a:ln>
-            <a:tailEnd type="triangle"/>
-          </a:ln>
-        </p:spPr>
-        <p:style>
-          <a:lnRef idx="1">
-            <a:schemeClr val="accent1"/>
-          </a:lnRef>
-          <a:fillRef idx="0">
-            <a:schemeClr val="accent1"/>
-          </a:fillRef>
-          <a:effectRef idx="0">
-            <a:schemeClr val="accent1"/>
-          </a:effectRef>
-          <a:fontRef idx="minor">
-            <a:schemeClr val="tx1"/>
-          </a:fontRef>
-        </p:style>
-      </p:cxnSp>
-      <p:sp>
-        <p:nvSpPr>
-          <p:cNvPr id="82" name="TextBox 81">
-            <a:extLst>
-              <a:ext uri="{FF2B5EF4-FFF2-40B4-BE49-F238E27FC236}">
-                <a16:creationId xmlns:a16="http://schemas.microsoft.com/office/drawing/2014/main" id="{A5E9CDBE-9501-CCF6-B1B6-9347D786801C}"/>
-              </a:ext>
-            </a:extLst>
-          </p:cNvPr>
-          <p:cNvSpPr txBox="1"/>
-          <p:nvPr/>
-        </p:nvSpPr>
-        <p:spPr>
-          <a:xfrm>
-            <a:off x="298729" y="3309792"/>
-            <a:ext cx="1691489" cy="246221"/>
-          </a:xfrm>
-          <a:prstGeom prst="rect">
-            <a:avLst/>
-          </a:prstGeom>
-          <a:noFill/>
-          <a:ln w="19050">
-            <a:solidFill>
-              <a:srgbClr val="00B050"/>
-            </a:solidFill>
-          </a:ln>
-        </p:spPr>
-        <p:txBody>
-          <a:bodyPr wrap="none" rtlCol="0">
-            <a:spAutoFit/>
-          </a:bodyPr>
-          <a:lstStyle/>
-          <a:p>
-            <a:r>
-              <a:rPr lang="en-US" altLang="ko-KR" sz="1000" dirty="0">
-                <a:solidFill>
-                  <a:srgbClr val="000000"/>
-                </a:solidFill>
-                <a:latin typeface="Cascadia Mono" panose="020B0609020000020004" pitchFamily="49" charset="0"/>
-              </a:rPr>
-              <a:t>TypeValueStorage</a:t>
-            </a:r>
-            <a:r>
-              <a:rPr lang="en-US" altLang="ko-KR" sz="1000" dirty="0">
-                <a:solidFill>
-                  <a:srgbClr val="00B0F0"/>
-                </a:solidFill>
-                <a:latin typeface="Cascadia Mono" panose="020B0609020000020004" pitchFamily="49" charset="0"/>
-              </a:rPr>
-              <a:t>&lt;'T&gt;</a:t>
-            </a:r>
-            <a:endParaRPr lang="ko-KR" altLang="en-US" sz="1000" dirty="0">
-              <a:solidFill>
-                <a:srgbClr val="00B0F0"/>
-              </a:solidFill>
-            </a:endParaRPr>
-          </a:p>
-        </p:txBody>
-      </p:sp>
-      <p:cxnSp>
-        <p:nvCxnSpPr>
-          <p:cNvPr id="84" name="직선 화살표 연결선 83">
-            <a:extLst>
-              <a:ext uri="{FF2B5EF4-FFF2-40B4-BE49-F238E27FC236}">
-                <a16:creationId xmlns:a16="http://schemas.microsoft.com/office/drawing/2014/main" id="{6EBA9CA0-3B46-7C7E-0D33-555398E04483}"/>
-              </a:ext>
-            </a:extLst>
-          </p:cNvPr>
-          <p:cNvCxnSpPr>
-            <a:cxnSpLocks/>
-            <a:stCxn id="82" idx="2"/>
-            <a:endCxn id="68" idx="0"/>
-          </p:cNvCxnSpPr>
-          <p:nvPr/>
-        </p:nvCxnSpPr>
-        <p:spPr>
-          <a:xfrm>
-            <a:off x="1144474" y="3556013"/>
-            <a:ext cx="2294500" cy="1401679"/>
-          </a:xfrm>
-          <a:prstGeom prst="straightConnector1">
-            <a:avLst/>
-          </a:prstGeom>
-          <a:ln>
-            <a:tailEnd type="triangle"/>
-          </a:ln>
-        </p:spPr>
-        <p:style>
-          <a:lnRef idx="1">
-            <a:schemeClr val="accent1"/>
-          </a:lnRef>
-          <a:fillRef idx="0">
-            <a:schemeClr val="accent1"/>
-          </a:fillRef>
-          <a:effectRef idx="0">
-            <a:schemeClr val="accent1"/>
-          </a:effectRef>
-          <a:fontRef idx="minor">
-            <a:schemeClr val="tx1"/>
-          </a:fontRef>
-        </p:style>
-      </p:cxnSp>
-      <p:sp>
-        <p:nvSpPr>
-          <p:cNvPr id="87" name="TextBox 86">
-            <a:extLst>
-              <a:ext uri="{FF2B5EF4-FFF2-40B4-BE49-F238E27FC236}">
-                <a16:creationId xmlns:a16="http://schemas.microsoft.com/office/drawing/2014/main" id="{2AEE3C5C-A27E-C5B9-AD83-2A636102083D}"/>
-              </a:ext>
-            </a:extLst>
-          </p:cNvPr>
-          <p:cNvSpPr txBox="1"/>
-          <p:nvPr/>
-        </p:nvSpPr>
-        <p:spPr>
-          <a:xfrm>
-            <a:off x="1350309" y="2304393"/>
-            <a:ext cx="787395" cy="246221"/>
-          </a:xfrm>
-          <a:prstGeom prst="rect">
-            <a:avLst/>
-          </a:prstGeom>
-          <a:noFill/>
-          <a:ln>
-            <a:solidFill>
-              <a:schemeClr val="tx1"/>
-            </a:solidFill>
-          </a:ln>
-        </p:spPr>
-        <p:txBody>
-          <a:bodyPr wrap="none" rtlCol="0">
-            <a:spAutoFit/>
-          </a:bodyPr>
-          <a:lstStyle/>
-          <a:p>
-            <a:r>
-              <a:rPr lang="en-US" altLang="ko-KR" sz="1000" dirty="0">
-                <a:solidFill>
-                  <a:srgbClr val="000000"/>
-                </a:solidFill>
-                <a:latin typeface="Cascadia Mono" panose="020B0609020000020004" pitchFamily="49" charset="0"/>
-              </a:rPr>
-              <a:t>ITag</a:t>
-            </a:r>
-            <a:r>
-              <a:rPr lang="en-US" altLang="ko-KR" sz="1000" dirty="0">
-                <a:solidFill>
-                  <a:srgbClr val="00B0F0"/>
-                </a:solidFill>
-                <a:latin typeface="Cascadia Mono" panose="020B0609020000020004" pitchFamily="49" charset="0"/>
-              </a:rPr>
-              <a:t>&lt;'T&gt;</a:t>
-            </a:r>
-            <a:endParaRPr lang="ko-KR" altLang="en-US" sz="1000" dirty="0">
-              <a:solidFill>
-                <a:srgbClr val="00B0F0"/>
-              </a:solidFill>
-            </a:endParaRPr>
-          </a:p>
-        </p:txBody>
-      </p:sp>
-      <p:cxnSp>
-        <p:nvCxnSpPr>
-          <p:cNvPr id="89" name="직선 화살표 연결선 88">
-            <a:extLst>
-              <a:ext uri="{FF2B5EF4-FFF2-40B4-BE49-F238E27FC236}">
-                <a16:creationId xmlns:a16="http://schemas.microsoft.com/office/drawing/2014/main" id="{FC9CC279-79CB-FEDA-E103-B80A600F379A}"/>
-              </a:ext>
-            </a:extLst>
-          </p:cNvPr>
-          <p:cNvCxnSpPr>
-            <a:stCxn id="87" idx="2"/>
-            <a:endCxn id="68" idx="0"/>
-          </p:cNvCxnSpPr>
-          <p:nvPr/>
-        </p:nvCxnSpPr>
-        <p:spPr>
-          <a:xfrm>
-            <a:off x="1744007" y="2550614"/>
-            <a:ext cx="1694967" cy="2407078"/>
-          </a:xfrm>
-          <a:prstGeom prst="straightConnector1">
-            <a:avLst/>
-          </a:prstGeom>
-          <a:ln>
-            <a:tailEnd type="triangle"/>
-          </a:ln>
-        </p:spPr>
-        <p:style>
-          <a:lnRef idx="1">
-            <a:schemeClr val="accent1"/>
-          </a:lnRef>
-          <a:fillRef idx="0">
-            <a:schemeClr val="accent1"/>
-          </a:fillRef>
-          <a:effectRef idx="0">
-            <a:schemeClr val="accent1"/>
-          </a:effectRef>
-          <a:fontRef idx="minor">
-            <a:schemeClr val="tx1"/>
-          </a:fontRef>
-        </p:style>
-      </p:cxnSp>
-      <p:cxnSp>
-        <p:nvCxnSpPr>
-          <p:cNvPr id="91" name="연결선: 구부러짐 90">
-            <a:extLst>
-              <a:ext uri="{FF2B5EF4-FFF2-40B4-BE49-F238E27FC236}">
-                <a16:creationId xmlns:a16="http://schemas.microsoft.com/office/drawing/2014/main" id="{C2AFC6C2-2C28-9AA2-7699-1B0593C82058}"/>
-              </a:ext>
-            </a:extLst>
-          </p:cNvPr>
-          <p:cNvCxnSpPr>
-            <a:stCxn id="9" idx="2"/>
-            <a:endCxn id="68" idx="0"/>
-          </p:cNvCxnSpPr>
-          <p:nvPr/>
-        </p:nvCxnSpPr>
-        <p:spPr>
-          <a:xfrm rot="5400000">
-            <a:off x="3364175" y="1554422"/>
-            <a:ext cx="3478070" cy="3328471"/>
-          </a:xfrm>
-          <a:prstGeom prst="curvedConnector3">
-            <a:avLst>
-              <a:gd name="adj1" fmla="val 55306"/>
-            </a:avLst>
-          </a:prstGeom>
-          <a:ln>
-            <a:tailEnd type="triangle"/>
-          </a:ln>
-        </p:spPr>
-        <p:style>
-          <a:lnRef idx="1">
-            <a:schemeClr val="accent1"/>
-          </a:lnRef>
-          <a:fillRef idx="0">
-            <a:schemeClr val="accent1"/>
-          </a:fillRef>
-          <a:effectRef idx="0">
-            <a:schemeClr val="accent1"/>
-          </a:effectRef>
-          <a:fontRef idx="minor">
-            <a:schemeClr val="tx1"/>
-          </a:fontRef>
-        </p:style>
-      </p:cxnSp>
-      <p:cxnSp>
-        <p:nvCxnSpPr>
-          <p:cNvPr id="93" name="직선 화살표 연결선 92">
-            <a:extLst>
-              <a:ext uri="{FF2B5EF4-FFF2-40B4-BE49-F238E27FC236}">
-                <a16:creationId xmlns:a16="http://schemas.microsoft.com/office/drawing/2014/main" id="{1B395758-AAC6-4D4E-6E65-76A0E443444A}"/>
-              </a:ext>
-            </a:extLst>
-          </p:cNvPr>
-          <p:cNvCxnSpPr>
-            <a:stCxn id="11" idx="2"/>
-            <a:endCxn id="73" idx="0"/>
-          </p:cNvCxnSpPr>
-          <p:nvPr/>
-        </p:nvCxnSpPr>
-        <p:spPr>
-          <a:xfrm flipH="1">
-            <a:off x="1144473" y="2534963"/>
-            <a:ext cx="1907190" cy="1976138"/>
-          </a:xfrm>
-          <a:prstGeom prst="straightConnector1">
-            <a:avLst/>
-          </a:prstGeom>
-          <a:ln>
-            <a:tailEnd type="triangle"/>
-          </a:ln>
-        </p:spPr>
-        <p:style>
-          <a:lnRef idx="1">
-            <a:schemeClr val="accent1"/>
-          </a:lnRef>
-          <a:fillRef idx="0">
-            <a:schemeClr val="accent1"/>
-          </a:fillRef>
-          <a:effectRef idx="0">
-            <a:schemeClr val="accent1"/>
-          </a:effectRef>
-          <a:fontRef idx="minor">
-            <a:schemeClr val="tx1"/>
-          </a:fontRef>
-        </p:style>
-      </p:cxnSp>
-      <p:cxnSp>
-        <p:nvCxnSpPr>
-          <p:cNvPr id="101" name="직선 화살표 연결선 100">
-            <a:extLst>
-              <a:ext uri="{FF2B5EF4-FFF2-40B4-BE49-F238E27FC236}">
-                <a16:creationId xmlns:a16="http://schemas.microsoft.com/office/drawing/2014/main" id="{582351F4-3E9B-65A6-6233-B344763C6FC1}"/>
-              </a:ext>
-            </a:extLst>
-          </p:cNvPr>
-          <p:cNvCxnSpPr>
-            <a:stCxn id="60" idx="2"/>
-            <a:endCxn id="82" idx="0"/>
-          </p:cNvCxnSpPr>
-          <p:nvPr/>
-        </p:nvCxnSpPr>
-        <p:spPr>
-          <a:xfrm flipH="1">
-            <a:off x="1144474" y="1685182"/>
-            <a:ext cx="3338" cy="1624610"/>
-          </a:xfrm>
-          <a:prstGeom prst="straightConnector1">
-            <a:avLst/>
-          </a:prstGeom>
-          <a:ln>
-            <a:tailEnd type="triangle"/>
-          </a:ln>
-        </p:spPr>
-        <p:style>
-          <a:lnRef idx="1">
-            <a:schemeClr val="accent1"/>
-          </a:lnRef>
-          <a:fillRef idx="0">
-            <a:schemeClr val="accent1"/>
-          </a:fillRef>
-          <a:effectRef idx="0">
-            <a:schemeClr val="accent1"/>
-          </a:effectRef>
-          <a:fontRef idx="minor">
-            <a:schemeClr val="tx1"/>
-          </a:fontRef>
-        </p:style>
-      </p:cxnSp>
-      <p:sp>
-        <p:nvSpPr>
-          <p:cNvPr id="102" name="TextBox 101">
-            <a:extLst>
-              <a:ext uri="{FF2B5EF4-FFF2-40B4-BE49-F238E27FC236}">
-                <a16:creationId xmlns:a16="http://schemas.microsoft.com/office/drawing/2014/main" id="{DD992637-325E-1878-83BF-4270EFFEB96D}"/>
-              </a:ext>
-            </a:extLst>
-          </p:cNvPr>
-          <p:cNvSpPr txBox="1"/>
-          <p:nvPr/>
-        </p:nvSpPr>
-        <p:spPr>
-          <a:xfrm>
-            <a:off x="2057794" y="718082"/>
-            <a:ext cx="787395" cy="246221"/>
-          </a:xfrm>
-          <a:prstGeom prst="rect">
-            <a:avLst/>
-          </a:prstGeom>
-          <a:noFill/>
-          <a:ln>
-            <a:solidFill>
-              <a:schemeClr val="tx1"/>
-            </a:solidFill>
-          </a:ln>
-        </p:spPr>
-        <p:txBody>
-          <a:bodyPr wrap="none" rtlCol="0">
-            <a:spAutoFit/>
-          </a:bodyPr>
-          <a:lstStyle/>
-          <a:p>
-            <a:r>
-              <a:rPr lang="en-US" altLang="ko-KR" sz="1000" dirty="0">
-                <a:solidFill>
-                  <a:srgbClr val="000000"/>
-                </a:solidFill>
-                <a:latin typeface="Cascadia Mono" panose="020B0609020000020004" pitchFamily="49" charset="0"/>
-              </a:rPr>
-              <a:t>IStorage</a:t>
-            </a:r>
-            <a:endParaRPr lang="ko-KR" altLang="en-US" sz="1000" dirty="0"/>
-          </a:p>
-        </p:txBody>
-      </p:sp>
-      <p:cxnSp>
-        <p:nvCxnSpPr>
-          <p:cNvPr id="103" name="직선 화살표 연결선 102">
-            <a:extLst>
-              <a:ext uri="{FF2B5EF4-FFF2-40B4-BE49-F238E27FC236}">
-                <a16:creationId xmlns:a16="http://schemas.microsoft.com/office/drawing/2014/main" id="{D8C83A20-84F8-E3FA-42D3-4C7D06E8929E}"/>
-              </a:ext>
-            </a:extLst>
-          </p:cNvPr>
-          <p:cNvCxnSpPr>
-            <a:cxnSpLocks/>
-            <a:stCxn id="102" idx="2"/>
-            <a:endCxn id="60" idx="0"/>
-          </p:cNvCxnSpPr>
-          <p:nvPr/>
-        </p:nvCxnSpPr>
-        <p:spPr>
-          <a:xfrm flipH="1">
-            <a:off x="1147812" y="964303"/>
-            <a:ext cx="1303680" cy="474658"/>
-          </a:xfrm>
-          <a:prstGeom prst="straightConnector1">
-            <a:avLst/>
-          </a:prstGeom>
-          <a:ln>
-            <a:tailEnd type="triangle"/>
-          </a:ln>
-        </p:spPr>
-        <p:style>
-          <a:lnRef idx="1">
-            <a:schemeClr val="accent1"/>
-          </a:lnRef>
-          <a:fillRef idx="0">
-            <a:schemeClr val="accent1"/>
-          </a:fillRef>
-          <a:effectRef idx="0">
-            <a:schemeClr val="accent1"/>
-          </a:effectRef>
-          <a:fontRef idx="minor">
-            <a:schemeClr val="tx1"/>
-          </a:fontRef>
-        </p:style>
-      </p:cxnSp>
-      <p:cxnSp>
-        <p:nvCxnSpPr>
-          <p:cNvPr id="114" name="직선 화살표 연결선 113">
-            <a:extLst>
-              <a:ext uri="{FF2B5EF4-FFF2-40B4-BE49-F238E27FC236}">
-                <a16:creationId xmlns:a16="http://schemas.microsoft.com/office/drawing/2014/main" id="{B4163B24-6089-B2D7-E6CB-23DF4FD4C370}"/>
-              </a:ext>
-            </a:extLst>
-          </p:cNvPr>
-          <p:cNvCxnSpPr>
-            <a:cxnSpLocks/>
-            <a:stCxn id="60" idx="2"/>
-            <a:endCxn id="11" idx="0"/>
-          </p:cNvCxnSpPr>
-          <p:nvPr/>
-        </p:nvCxnSpPr>
-        <p:spPr>
-          <a:xfrm>
-            <a:off x="1147812" y="1685182"/>
-            <a:ext cx="1903851" cy="603560"/>
-          </a:xfrm>
-          <a:prstGeom prst="straightConnector1">
-            <a:avLst/>
-          </a:prstGeom>
-          <a:ln>
-            <a:tailEnd type="triangle"/>
-          </a:ln>
-        </p:spPr>
-        <p:style>
-          <a:lnRef idx="1">
-            <a:schemeClr val="accent1"/>
-          </a:lnRef>
-          <a:fillRef idx="0">
-            <a:schemeClr val="accent1"/>
-          </a:fillRef>
-          <a:effectRef idx="0">
-            <a:schemeClr val="accent1"/>
-          </a:effectRef>
-          <a:fontRef idx="minor">
-            <a:schemeClr val="tx1"/>
-          </a:fontRef>
-        </p:style>
-      </p:cxnSp>
-      <p:sp>
-        <p:nvSpPr>
-          <p:cNvPr id="118" name="TextBox 117">
-            <a:extLst>
-              <a:ext uri="{FF2B5EF4-FFF2-40B4-BE49-F238E27FC236}">
-                <a16:creationId xmlns:a16="http://schemas.microsoft.com/office/drawing/2014/main" id="{C9FD86B0-C18A-FBC1-8223-AB3A6BCC00FE}"/>
-              </a:ext>
-            </a:extLst>
-          </p:cNvPr>
-          <p:cNvSpPr txBox="1"/>
-          <p:nvPr/>
-        </p:nvSpPr>
-        <p:spPr>
-          <a:xfrm>
-            <a:off x="2461592" y="1435333"/>
-            <a:ext cx="486030" cy="246221"/>
-          </a:xfrm>
-          <a:prstGeom prst="rect">
-            <a:avLst/>
-          </a:prstGeom>
-          <a:noFill/>
-          <a:ln>
-            <a:solidFill>
-              <a:schemeClr val="tx1"/>
-            </a:solidFill>
-          </a:ln>
-        </p:spPr>
-        <p:txBody>
-          <a:bodyPr wrap="none" rtlCol="0">
-            <a:spAutoFit/>
-          </a:bodyPr>
-          <a:lstStyle/>
-          <a:p>
-            <a:r>
-              <a:rPr lang="en-US" altLang="ko-KR" sz="1000" dirty="0">
-                <a:solidFill>
-                  <a:srgbClr val="000000"/>
-                </a:solidFill>
-                <a:latin typeface="Cascadia Mono" panose="020B0609020000020004" pitchFamily="49" charset="0"/>
-              </a:rPr>
-              <a:t>ITag</a:t>
-            </a:r>
-            <a:endParaRPr lang="ko-KR" altLang="en-US" sz="1000" dirty="0">
-              <a:solidFill>
-                <a:srgbClr val="00B0F0"/>
-              </a:solidFill>
-            </a:endParaRPr>
-          </a:p>
-        </p:txBody>
-      </p:sp>
-      <p:cxnSp>
-        <p:nvCxnSpPr>
-          <p:cNvPr id="119" name="직선 화살표 연결선 118">
-            <a:extLst>
-              <a:ext uri="{FF2B5EF4-FFF2-40B4-BE49-F238E27FC236}">
-                <a16:creationId xmlns:a16="http://schemas.microsoft.com/office/drawing/2014/main" id="{2DCFE58F-F95A-C7FE-98FD-47A07B654DC7}"/>
-              </a:ext>
-            </a:extLst>
-          </p:cNvPr>
-          <p:cNvCxnSpPr>
-            <a:cxnSpLocks/>
-            <a:stCxn id="118" idx="2"/>
-            <a:endCxn id="87" idx="0"/>
-          </p:cNvCxnSpPr>
-          <p:nvPr/>
-        </p:nvCxnSpPr>
-        <p:spPr>
-          <a:xfrm flipH="1">
-            <a:off x="1744007" y="1681554"/>
-            <a:ext cx="960600" cy="622839"/>
-          </a:xfrm>
-          <a:prstGeom prst="straightConnector1">
-            <a:avLst/>
-          </a:prstGeom>
-          <a:ln>
-            <a:tailEnd type="triangle"/>
-          </a:ln>
-        </p:spPr>
-        <p:style>
-          <a:lnRef idx="1">
-            <a:schemeClr val="accent1"/>
-          </a:lnRef>
-          <a:fillRef idx="0">
-            <a:schemeClr val="accent1"/>
-          </a:fillRef>
-          <a:effectRef idx="0">
-            <a:schemeClr val="accent1"/>
-          </a:effectRef>
-          <a:fontRef idx="minor">
-            <a:schemeClr val="tx1"/>
-          </a:fontRef>
-        </p:style>
-      </p:cxnSp>
-      <p:cxnSp>
-        <p:nvCxnSpPr>
-          <p:cNvPr id="121" name="직선 화살표 연결선 120">
-            <a:extLst>
-              <a:ext uri="{FF2B5EF4-FFF2-40B4-BE49-F238E27FC236}">
-                <a16:creationId xmlns:a16="http://schemas.microsoft.com/office/drawing/2014/main" id="{26B9D0D3-E599-08D1-4C78-775B70D604F3}"/>
-              </a:ext>
-            </a:extLst>
-          </p:cNvPr>
-          <p:cNvCxnSpPr>
-            <a:cxnSpLocks/>
-            <a:stCxn id="60" idx="2"/>
-            <a:endCxn id="87" idx="0"/>
-          </p:cNvCxnSpPr>
-          <p:nvPr/>
-        </p:nvCxnSpPr>
-        <p:spPr>
-          <a:xfrm>
-            <a:off x="1147812" y="1685182"/>
-            <a:ext cx="596195" cy="619211"/>
-          </a:xfrm>
-          <a:prstGeom prst="straightConnector1">
-            <a:avLst/>
-          </a:prstGeom>
-          <a:ln>
-            <a:tailEnd type="triangle"/>
-          </a:ln>
-        </p:spPr>
-        <p:style>
-          <a:lnRef idx="1">
-            <a:schemeClr val="accent1"/>
-          </a:lnRef>
-          <a:fillRef idx="0">
-            <a:schemeClr val="accent1"/>
-          </a:fillRef>
-          <a:effectRef idx="0">
-            <a:schemeClr val="accent1"/>
-          </a:effectRef>
-          <a:fontRef idx="minor">
-            <a:schemeClr val="tx1"/>
-          </a:fontRef>
-        </p:style>
-      </p:cxnSp>
-      <p:cxnSp>
-        <p:nvCxnSpPr>
-          <p:cNvPr id="124" name="직선 화살표 연결선 123">
-            <a:extLst>
-              <a:ext uri="{FF2B5EF4-FFF2-40B4-BE49-F238E27FC236}">
-                <a16:creationId xmlns:a16="http://schemas.microsoft.com/office/drawing/2014/main" id="{FAEA264D-F535-88A3-2E4A-89FEBCDC5471}"/>
-              </a:ext>
-            </a:extLst>
-          </p:cNvPr>
-          <p:cNvCxnSpPr>
-            <a:cxnSpLocks/>
-            <a:stCxn id="102" idx="2"/>
-            <a:endCxn id="118" idx="0"/>
-          </p:cNvCxnSpPr>
-          <p:nvPr/>
-        </p:nvCxnSpPr>
-        <p:spPr>
-          <a:xfrm>
-            <a:off x="2451492" y="964303"/>
-            <a:ext cx="253115" cy="471030"/>
-          </a:xfrm>
-          <a:prstGeom prst="straightConnector1">
-            <a:avLst/>
-          </a:prstGeom>
-          <a:ln>
-            <a:tailEnd type="triangle"/>
-          </a:ln>
-        </p:spPr>
-        <p:style>
-          <a:lnRef idx="1">
-            <a:schemeClr val="accent1"/>
-          </a:lnRef>
-          <a:fillRef idx="0">
-            <a:schemeClr val="accent1"/>
-          </a:fillRef>
-          <a:effectRef idx="0">
-            <a:schemeClr val="accent1"/>
-          </a:effectRef>
-          <a:fontRef idx="minor">
-            <a:schemeClr val="tx1"/>
-          </a:fontRef>
-        </p:style>
-      </p:cxnSp>
-      <p:cxnSp>
-        <p:nvCxnSpPr>
-          <p:cNvPr id="127" name="직선 화살표 연결선 126">
-            <a:extLst>
-              <a:ext uri="{FF2B5EF4-FFF2-40B4-BE49-F238E27FC236}">
-                <a16:creationId xmlns:a16="http://schemas.microsoft.com/office/drawing/2014/main" id="{D787EABA-F4D0-1F26-11B7-90F650596462}"/>
-              </a:ext>
-            </a:extLst>
-          </p:cNvPr>
-          <p:cNvCxnSpPr>
-            <a:cxnSpLocks/>
-            <a:stCxn id="102" idx="2"/>
-            <a:endCxn id="8" idx="0"/>
-          </p:cNvCxnSpPr>
-          <p:nvPr/>
-        </p:nvCxnSpPr>
-        <p:spPr>
-          <a:xfrm>
-            <a:off x="2451492" y="964303"/>
-            <a:ext cx="1439533" cy="467579"/>
-          </a:xfrm>
-          <a:prstGeom prst="straightConnector1">
-            <a:avLst/>
-          </a:prstGeom>
-          <a:ln>
-            <a:tailEnd type="triangle"/>
-          </a:ln>
-        </p:spPr>
-        <p:style>
-          <a:lnRef idx="1">
-            <a:schemeClr val="accent1"/>
-          </a:lnRef>
-          <a:fillRef idx="0">
-            <a:schemeClr val="accent1"/>
-          </a:fillRef>
-          <a:effectRef idx="0">
-            <a:schemeClr val="accent1"/>
-          </a:effectRef>
-          <a:fontRef idx="minor">
-            <a:schemeClr val="tx1"/>
-          </a:fontRef>
-        </p:style>
-      </p:cxnSp>
-      <p:sp>
-        <p:nvSpPr>
-          <p:cNvPr id="133" name="TextBox 132">
-            <a:extLst>
-              <a:ext uri="{FF2B5EF4-FFF2-40B4-BE49-F238E27FC236}">
-                <a16:creationId xmlns:a16="http://schemas.microsoft.com/office/drawing/2014/main" id="{E1296922-152E-0D98-22AF-3BB1861F6E4F}"/>
-              </a:ext>
-            </a:extLst>
-          </p:cNvPr>
-          <p:cNvSpPr txBox="1"/>
-          <p:nvPr/>
-        </p:nvSpPr>
-        <p:spPr>
-          <a:xfrm>
-            <a:off x="684519" y="718082"/>
-            <a:ext cx="938077" cy="246221"/>
-          </a:xfrm>
-          <a:prstGeom prst="rect">
-            <a:avLst/>
-          </a:prstGeom>
-          <a:noFill/>
-          <a:ln>
-            <a:solidFill>
-              <a:schemeClr val="tx1"/>
-            </a:solidFill>
-          </a:ln>
-        </p:spPr>
-        <p:txBody>
-          <a:bodyPr wrap="none" rtlCol="0">
-            <a:spAutoFit/>
-          </a:bodyPr>
-          <a:lstStyle/>
-          <a:p>
-            <a:r>
-              <a:rPr lang="en-US" altLang="ko-KR" sz="1000" dirty="0">
-                <a:solidFill>
-                  <a:srgbClr val="000000"/>
-                </a:solidFill>
-                <a:latin typeface="Cascadia Mono" panose="020B0609020000020004" pitchFamily="49" charset="0"/>
-              </a:rPr>
-              <a:t>IValue</a:t>
-            </a:r>
-            <a:r>
-              <a:rPr lang="en-US" altLang="ko-KR" sz="1000" dirty="0">
-                <a:solidFill>
-                  <a:srgbClr val="00B0F0"/>
-                </a:solidFill>
-                <a:latin typeface="Cascadia Mono" panose="020B0609020000020004" pitchFamily="49" charset="0"/>
-              </a:rPr>
-              <a:t>&lt;'T&gt;</a:t>
-            </a:r>
-            <a:endParaRPr lang="ko-KR" altLang="en-US" sz="1000" dirty="0"/>
-          </a:p>
-        </p:txBody>
-      </p:sp>
-      <p:cxnSp>
-        <p:nvCxnSpPr>
-          <p:cNvPr id="134" name="직선 화살표 연결선 133">
-            <a:extLst>
-              <a:ext uri="{FF2B5EF4-FFF2-40B4-BE49-F238E27FC236}">
-                <a16:creationId xmlns:a16="http://schemas.microsoft.com/office/drawing/2014/main" id="{22B76BFF-5231-BB8F-6B2A-55CDD7AFAEFC}"/>
-              </a:ext>
-            </a:extLst>
-          </p:cNvPr>
-          <p:cNvCxnSpPr>
-            <a:cxnSpLocks/>
-            <a:stCxn id="133" idx="2"/>
-            <a:endCxn id="60" idx="0"/>
-          </p:cNvCxnSpPr>
-          <p:nvPr/>
-        </p:nvCxnSpPr>
-        <p:spPr>
-          <a:xfrm flipH="1">
-            <a:off x="1147812" y="964303"/>
-            <a:ext cx="5746" cy="474658"/>
-          </a:xfrm>
-          <a:prstGeom prst="straightConnector1">
-            <a:avLst/>
-          </a:prstGeom>
-          <a:ln>
-            <a:tailEnd type="triangle"/>
-          </a:ln>
-        </p:spPr>
-        <p:style>
-          <a:lnRef idx="1">
-            <a:schemeClr val="accent1"/>
-          </a:lnRef>
-          <a:fillRef idx="0">
-            <a:schemeClr val="accent1"/>
-          </a:fillRef>
-          <a:effectRef idx="0">
-            <a:schemeClr val="accent1"/>
-          </a:effectRef>
-          <a:fontRef idx="minor">
-            <a:schemeClr val="tx1"/>
-          </a:fontRef>
-        </p:style>
-      </p:cxnSp>
-      <p:cxnSp>
-        <p:nvCxnSpPr>
-          <p:cNvPr id="153" name="연결선: 구부러짐 152">
-            <a:extLst>
-              <a:ext uri="{FF2B5EF4-FFF2-40B4-BE49-F238E27FC236}">
-                <a16:creationId xmlns:a16="http://schemas.microsoft.com/office/drawing/2014/main" id="{67455454-DB7C-33CA-D163-7606D211E37B}"/>
-              </a:ext>
-            </a:extLst>
-          </p:cNvPr>
-          <p:cNvCxnSpPr>
-            <a:cxnSpLocks/>
-            <a:stCxn id="82" idx="2"/>
-            <a:endCxn id="28" idx="0"/>
-          </p:cNvCxnSpPr>
-          <p:nvPr/>
-        </p:nvCxnSpPr>
-        <p:spPr>
-          <a:xfrm rot="16200000" flipH="1">
-            <a:off x="2018478" y="2682008"/>
-            <a:ext cx="380629" cy="2128637"/>
-          </a:xfrm>
-          <a:prstGeom prst="curvedConnector3">
-            <a:avLst>
-              <a:gd name="adj1" fmla="val 50000"/>
-            </a:avLst>
-          </a:prstGeom>
-          <a:ln>
-            <a:tailEnd type="triangle"/>
-          </a:ln>
-        </p:spPr>
-        <p:style>
-          <a:lnRef idx="1">
-            <a:schemeClr val="accent1"/>
-          </a:lnRef>
-          <a:fillRef idx="0">
-            <a:schemeClr val="accent1"/>
-          </a:fillRef>
-          <a:effectRef idx="0">
-            <a:schemeClr val="accent1"/>
-          </a:effectRef>
-          <a:fontRef idx="minor">
-            <a:schemeClr val="tx1"/>
-          </a:fontRef>
-        </p:style>
-      </p:cxnSp>
-      <p:sp>
-        <p:nvSpPr>
-          <p:cNvPr id="221" name="TextBox 220">
-            <a:extLst>
-              <a:ext uri="{FF2B5EF4-FFF2-40B4-BE49-F238E27FC236}">
-                <a16:creationId xmlns:a16="http://schemas.microsoft.com/office/drawing/2014/main" id="{42CC68D1-2BB7-3870-FCA4-6ED5B3331360}"/>
-              </a:ext>
-            </a:extLst>
-          </p:cNvPr>
-          <p:cNvSpPr txBox="1"/>
-          <p:nvPr/>
-        </p:nvSpPr>
-        <p:spPr>
-          <a:xfrm>
-            <a:off x="8627078" y="4076413"/>
-            <a:ext cx="1239442" cy="246221"/>
-          </a:xfrm>
-          <a:prstGeom prst="rect">
-            <a:avLst/>
-          </a:prstGeom>
-          <a:noFill/>
-          <a:ln>
-            <a:solidFill>
-              <a:schemeClr val="tx1"/>
-            </a:solidFill>
-          </a:ln>
-        </p:spPr>
-        <p:txBody>
-          <a:bodyPr wrap="none" rtlCol="0">
-            <a:spAutoFit/>
-          </a:bodyPr>
-          <a:lstStyle/>
-          <a:p>
-            <a:r>
-              <a:rPr lang="en-US" altLang="ko-KR" sz="1000" dirty="0">
-                <a:solidFill>
-                  <a:srgbClr val="000000"/>
-                </a:solidFill>
-                <a:latin typeface="Cascadia Mono" panose="020B0609020000020004" pitchFamily="49" charset="0"/>
-              </a:rPr>
-              <a:t>ILiteralHolder</a:t>
-            </a:r>
-            <a:endParaRPr lang="ko-KR" altLang="en-US" sz="1000" dirty="0"/>
-          </a:p>
-        </p:txBody>
-      </p:sp>
-      <p:sp>
-        <p:nvSpPr>
-          <p:cNvPr id="222" name="TextBox 221">
-            <a:extLst>
-              <a:ext uri="{FF2B5EF4-FFF2-40B4-BE49-F238E27FC236}">
-                <a16:creationId xmlns:a16="http://schemas.microsoft.com/office/drawing/2014/main" id="{7B6261E0-3635-414A-39BD-EC9E8D779EA7}"/>
-              </a:ext>
-            </a:extLst>
-          </p:cNvPr>
-          <p:cNvSpPr txBox="1"/>
-          <p:nvPr/>
-        </p:nvSpPr>
-        <p:spPr>
-          <a:xfrm>
-            <a:off x="7973056" y="5245188"/>
-            <a:ext cx="1465466" cy="246221"/>
-          </a:xfrm>
-          <a:prstGeom prst="rect">
-            <a:avLst/>
-          </a:prstGeom>
-          <a:noFill/>
-          <a:ln w="19050">
-            <a:solidFill>
-              <a:srgbClr val="00B050"/>
-            </a:solidFill>
-          </a:ln>
-        </p:spPr>
-        <p:txBody>
-          <a:bodyPr wrap="none" rtlCol="0">
-            <a:spAutoFit/>
-          </a:bodyPr>
-          <a:lstStyle/>
-          <a:p>
-            <a:r>
-              <a:rPr lang="en-US" altLang="ko-KR" sz="1000" dirty="0">
-                <a:solidFill>
-                  <a:srgbClr val="000000"/>
-                </a:solidFill>
-                <a:latin typeface="Cascadia Mono" panose="020B0609020000020004" pitchFamily="49" charset="0"/>
-              </a:rPr>
-              <a:t>LiteralHolder</a:t>
-            </a:r>
-            <a:r>
-              <a:rPr lang="en-US" altLang="ko-KR" sz="1000" dirty="0">
-                <a:solidFill>
-                  <a:srgbClr val="00B0F0"/>
-                </a:solidFill>
-                <a:latin typeface="Cascadia Mono" panose="020B0609020000020004" pitchFamily="49" charset="0"/>
-              </a:rPr>
-              <a:t>&lt;'T&gt;</a:t>
-            </a:r>
-            <a:endParaRPr lang="ko-KR" altLang="en-US" sz="1000" dirty="0">
-              <a:solidFill>
-                <a:srgbClr val="00B0F0"/>
-              </a:solidFill>
-            </a:endParaRPr>
-          </a:p>
-        </p:txBody>
-      </p:sp>
-      <p:cxnSp>
-        <p:nvCxnSpPr>
-          <p:cNvPr id="223" name="직선 화살표 연결선 222">
-            <a:extLst>
-              <a:ext uri="{FF2B5EF4-FFF2-40B4-BE49-F238E27FC236}">
-                <a16:creationId xmlns:a16="http://schemas.microsoft.com/office/drawing/2014/main" id="{4F76AC4A-EB46-0F5A-C7F4-8E41F52780EE}"/>
-              </a:ext>
-            </a:extLst>
-          </p:cNvPr>
-          <p:cNvCxnSpPr>
-            <a:cxnSpLocks/>
-            <a:stCxn id="221" idx="2"/>
-            <a:endCxn id="222" idx="0"/>
-          </p:cNvCxnSpPr>
-          <p:nvPr/>
-        </p:nvCxnSpPr>
-        <p:spPr>
-          <a:xfrm flipH="1">
-            <a:off x="8705789" y="4322634"/>
-            <a:ext cx="541010" cy="922554"/>
-          </a:xfrm>
-          <a:prstGeom prst="straightConnector1">
-            <a:avLst/>
-          </a:prstGeom>
-          <a:ln>
-            <a:tailEnd type="triangle"/>
-          </a:ln>
-        </p:spPr>
-        <p:style>
-          <a:lnRef idx="1">
-            <a:schemeClr val="accent1"/>
-          </a:lnRef>
-          <a:fillRef idx="0">
-            <a:schemeClr val="accent1"/>
-          </a:fillRef>
-          <a:effectRef idx="0">
-            <a:schemeClr val="accent1"/>
-          </a:effectRef>
-          <a:fontRef idx="minor">
-            <a:schemeClr val="tx1"/>
-          </a:fontRef>
-        </p:style>
-      </p:cxnSp>
-      <p:cxnSp>
-        <p:nvCxnSpPr>
-          <p:cNvPr id="225" name="직선 화살표 연결선 224">
-            <a:extLst>
-              <a:ext uri="{FF2B5EF4-FFF2-40B4-BE49-F238E27FC236}">
-                <a16:creationId xmlns:a16="http://schemas.microsoft.com/office/drawing/2014/main" id="{0A163A93-3551-0257-85CD-CF38C89BFDAF}"/>
-              </a:ext>
-            </a:extLst>
-          </p:cNvPr>
-          <p:cNvCxnSpPr>
-            <a:cxnSpLocks/>
-            <a:stCxn id="9" idx="2"/>
-            <a:endCxn id="222" idx="0"/>
-          </p:cNvCxnSpPr>
-          <p:nvPr/>
-        </p:nvCxnSpPr>
-        <p:spPr>
-          <a:xfrm>
-            <a:off x="6767445" y="1479622"/>
-            <a:ext cx="1938344" cy="3765566"/>
-          </a:xfrm>
-          <a:prstGeom prst="straightConnector1">
-            <a:avLst/>
-          </a:prstGeom>
-          <a:ln>
-            <a:tailEnd type="triangle"/>
-          </a:ln>
-        </p:spPr>
-        <p:style>
-          <a:lnRef idx="1">
-            <a:schemeClr val="accent1"/>
-          </a:lnRef>
-          <a:fillRef idx="0">
-            <a:schemeClr val="accent1"/>
-          </a:fillRef>
-          <a:effectRef idx="0">
-            <a:schemeClr val="accent1"/>
-          </a:effectRef>
-          <a:fontRef idx="minor">
-            <a:schemeClr val="tx1"/>
-          </a:fontRef>
-        </p:style>
-      </p:cxnSp>
-      <p:cxnSp>
-        <p:nvCxnSpPr>
-          <p:cNvPr id="231" name="직선 화살표 연결선 230">
-            <a:extLst>
-              <a:ext uri="{FF2B5EF4-FFF2-40B4-BE49-F238E27FC236}">
-                <a16:creationId xmlns:a16="http://schemas.microsoft.com/office/drawing/2014/main" id="{7BA9A8B8-063F-94C6-47B8-6CAF9154A881}"/>
-              </a:ext>
-            </a:extLst>
-          </p:cNvPr>
-          <p:cNvCxnSpPr>
-            <a:cxnSpLocks/>
-            <a:stCxn id="11" idx="2"/>
-            <a:endCxn id="28" idx="0"/>
-          </p:cNvCxnSpPr>
-          <p:nvPr/>
-        </p:nvCxnSpPr>
-        <p:spPr>
-          <a:xfrm>
-            <a:off x="3051663" y="2534963"/>
-            <a:ext cx="221448" cy="1401679"/>
-          </a:xfrm>
-          <a:prstGeom prst="straightConnector1">
-            <a:avLst/>
-          </a:prstGeom>
-          <a:ln>
-            <a:tailEnd type="triangle"/>
-          </a:ln>
-        </p:spPr>
-        <p:style>
-          <a:lnRef idx="1">
-            <a:schemeClr val="accent1"/>
-          </a:lnRef>
-          <a:fillRef idx="0">
-            <a:schemeClr val="accent1"/>
-          </a:fillRef>
-          <a:effectRef idx="0">
-            <a:schemeClr val="accent1"/>
-          </a:effectRef>
-          <a:fontRef idx="minor">
-            <a:schemeClr val="tx1"/>
-          </a:fontRef>
-        </p:style>
-      </p:cxnSp>
-      <p:cxnSp>
-        <p:nvCxnSpPr>
-          <p:cNvPr id="5" name="직선 화살표 연결선 4">
-            <a:extLst>
-              <a:ext uri="{FF2B5EF4-FFF2-40B4-BE49-F238E27FC236}">
-                <a16:creationId xmlns:a16="http://schemas.microsoft.com/office/drawing/2014/main" id="{F68D8CD6-4A17-924D-2788-02FD9D4DA053}"/>
-              </a:ext>
-            </a:extLst>
-          </p:cNvPr>
-          <p:cNvCxnSpPr>
-            <a:cxnSpLocks/>
-            <a:stCxn id="28" idx="2"/>
-            <a:endCxn id="71" idx="0"/>
-          </p:cNvCxnSpPr>
-          <p:nvPr/>
-        </p:nvCxnSpPr>
-        <p:spPr>
-          <a:xfrm flipH="1">
-            <a:off x="1144473" y="4182863"/>
-            <a:ext cx="2128638" cy="1106792"/>
-          </a:xfrm>
-          <a:prstGeom prst="straightConnector1">
-            <a:avLst/>
-          </a:prstGeom>
-          <a:ln>
-            <a:tailEnd type="triangle"/>
-          </a:ln>
-        </p:spPr>
-        <p:style>
-          <a:lnRef idx="1">
-            <a:schemeClr val="accent1"/>
-          </a:lnRef>
-          <a:fillRef idx="0">
-            <a:schemeClr val="accent1"/>
-          </a:fillRef>
-          <a:effectRef idx="0">
-            <a:schemeClr val="accent1"/>
-          </a:effectRef>
-          <a:fontRef idx="minor">
-            <a:schemeClr val="tx1"/>
-          </a:fontRef>
-        </p:style>
-      </p:cxnSp>
-      <p:sp>
-        <p:nvSpPr>
-          <p:cNvPr id="15" name="TextBox 14">
-            <a:extLst>
-              <a:ext uri="{FF2B5EF4-FFF2-40B4-BE49-F238E27FC236}">
-                <a16:creationId xmlns:a16="http://schemas.microsoft.com/office/drawing/2014/main" id="{61EE7F52-560A-1E23-DE02-1CABADA9890E}"/>
-              </a:ext>
-            </a:extLst>
-          </p:cNvPr>
-          <p:cNvSpPr txBox="1"/>
-          <p:nvPr/>
-        </p:nvSpPr>
-        <p:spPr>
-          <a:xfrm>
-            <a:off x="1218560" y="149151"/>
-            <a:ext cx="636713" cy="246221"/>
-          </a:xfrm>
-          <a:prstGeom prst="rect">
-            <a:avLst/>
-          </a:prstGeom>
-          <a:noFill/>
-          <a:ln>
-            <a:solidFill>
-              <a:schemeClr val="tx1"/>
-            </a:solidFill>
-          </a:ln>
-        </p:spPr>
-        <p:txBody>
-          <a:bodyPr wrap="none" rtlCol="0">
-            <a:spAutoFit/>
-          </a:bodyPr>
-          <a:lstStyle/>
-          <a:p>
-            <a:r>
-              <a:rPr lang="en-US" altLang="ko-KR" sz="1000" dirty="0">
-                <a:solidFill>
-                  <a:srgbClr val="000000"/>
-                </a:solidFill>
-                <a:latin typeface="Cascadia Mono" panose="020B0609020000020004" pitchFamily="49" charset="0"/>
-              </a:rPr>
-              <a:t>IValue</a:t>
-            </a:r>
-            <a:endParaRPr lang="ko-KR" altLang="en-US" sz="1000" dirty="0"/>
-          </a:p>
-        </p:txBody>
-      </p:sp>
-      <p:cxnSp>
-        <p:nvCxnSpPr>
-          <p:cNvPr id="16" name="직선 화살표 연결선 15">
-            <a:extLst>
-              <a:ext uri="{FF2B5EF4-FFF2-40B4-BE49-F238E27FC236}">
-                <a16:creationId xmlns:a16="http://schemas.microsoft.com/office/drawing/2014/main" id="{2C849333-6D15-77AB-9B8A-856E0F958A3E}"/>
-              </a:ext>
-            </a:extLst>
-          </p:cNvPr>
-          <p:cNvCxnSpPr>
-            <a:cxnSpLocks/>
-            <a:stCxn id="15" idx="2"/>
-            <a:endCxn id="133" idx="0"/>
-          </p:cNvCxnSpPr>
-          <p:nvPr/>
-        </p:nvCxnSpPr>
-        <p:spPr>
-          <a:xfrm flipH="1">
-            <a:off x="1153558" y="395372"/>
-            <a:ext cx="383359" cy="322710"/>
-          </a:xfrm>
-          <a:prstGeom prst="straightConnector1">
-            <a:avLst/>
-          </a:prstGeom>
-          <a:ln>
-            <a:tailEnd type="triangle"/>
-          </a:ln>
-        </p:spPr>
-        <p:style>
-          <a:lnRef idx="1">
-            <a:schemeClr val="accent1"/>
-          </a:lnRef>
-          <a:fillRef idx="0">
-            <a:schemeClr val="accent1"/>
-          </a:fillRef>
-          <a:effectRef idx="0">
-            <a:schemeClr val="accent1"/>
-          </a:effectRef>
-          <a:fontRef idx="minor">
-            <a:schemeClr val="tx1"/>
-          </a:fontRef>
-        </p:style>
-      </p:cxnSp>
-      <p:cxnSp>
-        <p:nvCxnSpPr>
-          <p:cNvPr id="19" name="직선 화살표 연결선 18">
-            <a:extLst>
-              <a:ext uri="{FF2B5EF4-FFF2-40B4-BE49-F238E27FC236}">
-                <a16:creationId xmlns:a16="http://schemas.microsoft.com/office/drawing/2014/main" id="{3C9A8D1B-367D-BC57-4944-D1893C755961}"/>
-              </a:ext>
-            </a:extLst>
-          </p:cNvPr>
-          <p:cNvCxnSpPr>
-            <a:cxnSpLocks/>
-            <a:stCxn id="15" idx="2"/>
-            <a:endCxn id="102" idx="0"/>
-          </p:cNvCxnSpPr>
-          <p:nvPr/>
-        </p:nvCxnSpPr>
-        <p:spPr>
-          <a:xfrm>
-            <a:off x="1536917" y="395372"/>
-            <a:ext cx="914575" cy="322710"/>
-          </a:xfrm>
-          <a:prstGeom prst="straightConnector1">
-            <a:avLst/>
-          </a:prstGeom>
-          <a:ln>
-            <a:tailEnd type="triangle"/>
-          </a:ln>
-        </p:spPr>
-        <p:style>
-          <a:lnRef idx="1">
-            <a:schemeClr val="accent1"/>
-          </a:lnRef>
-          <a:fillRef idx="0">
-            <a:schemeClr val="accent1"/>
-          </a:fillRef>
-          <a:effectRef idx="0">
-            <a:schemeClr val="accent1"/>
-          </a:effectRef>
-          <a:fontRef idx="minor">
-            <a:schemeClr val="tx1"/>
-          </a:fontRef>
-        </p:style>
-      </p:cxnSp>
+              <a:rPr lang="en-US" altLang="ko-KR" dirty="0"/>
+              <a:t> </a:t>
+            </a:r>
+            <a:r>
+              <a:rPr lang="ko-KR" altLang="en-US" dirty="0"/>
+              <a:t>수정 사항 있을 시</a:t>
+            </a:r>
+            <a:r>
+              <a:rPr lang="en-US" altLang="ko-KR" dirty="0"/>
+              <a:t>, </a:t>
+            </a:r>
+            <a:r>
+              <a:rPr lang="en-US" altLang="ko-KR" dirty="0" err="1"/>
+              <a:t>DsDotNet</a:t>
+            </a:r>
+            <a:r>
+              <a:rPr lang="en-US" altLang="ko-KR" dirty="0"/>
+              <a:t>/</a:t>
+            </a:r>
+            <a:r>
+              <a:rPr lang="en-US" altLang="ko-KR" dirty="0" err="1"/>
+              <a:t>src</a:t>
+            </a:r>
+            <a:r>
+              <a:rPr lang="en-US" altLang="ko-KR" dirty="0"/>
+              <a:t>/Doc/Hierachies.pptx </a:t>
+            </a:r>
+            <a:r>
+              <a:rPr lang="ko-KR" altLang="en-US" dirty="0"/>
+              <a:t>파일을 수정할 것</a:t>
+            </a:r>
+            <a:r>
+              <a:rPr lang="en-US" altLang="ko-KR" dirty="0"/>
+              <a:t>!!</a:t>
+            </a:r>
+            <a:endParaRPr lang="ko-KR" altLang="en-US" dirty="0"/>
+          </a:p>
+        </p:txBody>
+      </p:sp>
     </p:spTree>
     <p:extLst>
       <p:ext uri="{BB962C8B-B14F-4D97-AF65-F5344CB8AC3E}">

</xml_diff>